<commit_message>
Updated docs of screen
</commit_message>
<xml_diff>
--- a/Docs/SceenMemoryMap.pptx
+++ b/Docs/SceenMemoryMap.pptx
@@ -7,7 +7,7 @@
   <p:sldIdLst>
     <p:sldId id="256" r:id="rId2"/>
     <p:sldId id="257" r:id="rId3"/>
-    <p:sldId id="258" r:id="rId4"/>
+    <p:sldId id="259" r:id="rId4"/>
   </p:sldIdLst>
   <p:sldSz cx="12192000" cy="6858000"/>
   <p:notesSz cx="6797675" cy="9926638"/>
@@ -6768,7 +6768,7 @@
         </p:nvCxnSpPr>
         <p:spPr>
           <a:xfrm>
-            <a:off x="3287688" y="1124744"/>
+            <a:off x="2639616" y="1109645"/>
             <a:ext cx="0" cy="4638709"/>
           </a:xfrm>
           <a:prstGeom prst="line">
@@ -6813,7 +6813,7 @@
         </p:nvCxnSpPr>
         <p:spPr>
           <a:xfrm flipH="1">
-            <a:off x="3287688" y="5733256"/>
+            <a:off x="2639616" y="5718157"/>
             <a:ext cx="6696744" cy="30197"/>
           </a:xfrm>
           <a:prstGeom prst="line">
@@ -6855,7 +6855,7 @@
         </p:nvSpPr>
         <p:spPr>
           <a:xfrm>
-            <a:off x="2966068" y="5610145"/>
+            <a:off x="2317996" y="5595046"/>
             <a:ext cx="250390" cy="276999"/>
           </a:xfrm>
           <a:prstGeom prst="rect">
@@ -6890,7 +6890,7 @@
         </p:nvGrpSpPr>
         <p:grpSpPr>
           <a:xfrm>
-            <a:off x="3359696" y="4442550"/>
+            <a:off x="2711624" y="4427451"/>
             <a:ext cx="878207" cy="1276831"/>
             <a:chOff x="4079775" y="3429000"/>
             <a:chExt cx="878207" cy="1276831"/>
@@ -7090,7 +7090,7 @@
         </p:nvGrpSpPr>
         <p:grpSpPr>
           <a:xfrm>
-            <a:off x="4326678" y="4444045"/>
+            <a:off x="3678606" y="4428946"/>
             <a:ext cx="878207" cy="1276831"/>
             <a:chOff x="4079775" y="3429000"/>
             <a:chExt cx="878207" cy="1276831"/>
@@ -7292,7 +7292,7 @@
         </p:nvCxnSpPr>
         <p:spPr>
           <a:xfrm flipV="1">
-            <a:off x="3975754" y="4760928"/>
+            <a:off x="3327682" y="4745829"/>
             <a:ext cx="535137" cy="597832"/>
           </a:xfrm>
           <a:prstGeom prst="straightConnector1">
@@ -7334,7 +7334,7 @@
         </p:nvSpPr>
         <p:spPr>
           <a:xfrm>
-            <a:off x="2946779" y="4437112"/>
+            <a:off x="2298707" y="4422013"/>
             <a:ext cx="250390" cy="276999"/>
           </a:xfrm>
           <a:prstGeom prst="rect">
@@ -7369,7 +7369,7 @@
         </p:nvSpPr>
         <p:spPr>
           <a:xfrm>
-            <a:off x="3287688" y="5805751"/>
+            <a:off x="2639616" y="5790652"/>
             <a:ext cx="250390" cy="276999"/>
           </a:xfrm>
           <a:prstGeom prst="rect">
@@ -7404,7 +7404,7 @@
         </p:nvSpPr>
         <p:spPr>
           <a:xfrm>
-            <a:off x="3987513" y="5805751"/>
+            <a:off x="3339441" y="5790652"/>
             <a:ext cx="250390" cy="276999"/>
           </a:xfrm>
           <a:prstGeom prst="rect">
@@ -7420,7 +7420,7 @@
           <a:p>
             <a:r>
               <a:rPr lang="en-GB" sz="1200" b="1" dirty="0"/>
-              <a:t>7</a:t>
+              <a:t>3</a:t>
             </a:r>
           </a:p>
         </p:txBody>
@@ -7439,7 +7439,7 @@
         </p:nvSpPr>
         <p:spPr>
           <a:xfrm>
-            <a:off x="4261706" y="5805751"/>
+            <a:off x="3613634" y="5790652"/>
             <a:ext cx="250390" cy="276999"/>
           </a:xfrm>
           <a:prstGeom prst="rect">
@@ -7455,7 +7455,7 @@
           <a:p>
             <a:r>
               <a:rPr lang="en-GB" sz="1200" b="1" dirty="0"/>
-              <a:t>8</a:t>
+              <a:t>4</a:t>
             </a:r>
           </a:p>
         </p:txBody>
@@ -7474,7 +7474,7 @@
         </p:nvSpPr>
         <p:spPr>
           <a:xfrm>
-            <a:off x="4871864" y="5805751"/>
+            <a:off x="4223792" y="5790652"/>
             <a:ext cx="346779" cy="276999"/>
           </a:xfrm>
           <a:prstGeom prst="rect">
@@ -7490,7 +7490,7 @@
           <a:p>
             <a:r>
               <a:rPr lang="en-GB" sz="1200" b="1" dirty="0"/>
-              <a:t>15</a:t>
+              <a:t>7</a:t>
             </a:r>
           </a:p>
         </p:txBody>
@@ -7509,7 +7509,7 @@
         </p:nvGrpSpPr>
         <p:grpSpPr>
           <a:xfrm>
-            <a:off x="3383499" y="1124744"/>
+            <a:off x="2735427" y="1109645"/>
             <a:ext cx="878207" cy="1276831"/>
             <a:chOff x="4079775" y="3429000"/>
             <a:chExt cx="878207" cy="1276831"/>
@@ -7709,7 +7709,7 @@
         </p:nvGrpSpPr>
         <p:grpSpPr>
           <a:xfrm>
-            <a:off x="4350481" y="1126239"/>
+            <a:off x="3702409" y="1111140"/>
             <a:ext cx="878207" cy="1276831"/>
             <a:chOff x="4079775" y="3429000"/>
             <a:chExt cx="878207" cy="1276831"/>
@@ -7909,7 +7909,7 @@
         </p:nvSpPr>
         <p:spPr>
           <a:xfrm>
-            <a:off x="2684315" y="1310135"/>
+            <a:off x="2036243" y="1295036"/>
             <a:ext cx="682436" cy="276999"/>
           </a:xfrm>
           <a:prstGeom prst="rect">
@@ -7951,7 +7951,7 @@
         </p:nvSpPr>
         <p:spPr>
           <a:xfrm>
-            <a:off x="2893214" y="1132274"/>
+            <a:off x="2245142" y="1117175"/>
             <a:ext cx="429993" cy="276999"/>
           </a:xfrm>
           <a:prstGeom prst="rect">
@@ -7987,7 +7987,7 @@
         </p:nvSpPr>
         <p:spPr>
           <a:xfrm>
-            <a:off x="2605561" y="2136621"/>
+            <a:off x="1957489" y="2121522"/>
             <a:ext cx="682436" cy="276999"/>
           </a:xfrm>
           <a:prstGeom prst="rect">
@@ -8023,7 +8023,7 @@
         </p:nvSpPr>
         <p:spPr>
           <a:xfrm>
-            <a:off x="9480376" y="5805751"/>
+            <a:off x="8832304" y="5790652"/>
             <a:ext cx="433425" cy="276999"/>
           </a:xfrm>
           <a:prstGeom prst="rect">
@@ -8059,7 +8059,7 @@
         </p:nvSpPr>
         <p:spPr>
           <a:xfrm>
-            <a:off x="9317999" y="6031097"/>
+            <a:off x="8669927" y="6015998"/>
             <a:ext cx="682436" cy="276999"/>
           </a:xfrm>
           <a:prstGeom prst="rect">
@@ -8101,7 +8101,7 @@
         </p:nvSpPr>
         <p:spPr>
           <a:xfrm>
-            <a:off x="6002282" y="6085278"/>
+            <a:off x="5354210" y="6070179"/>
             <a:ext cx="1656184" cy="461665"/>
           </a:xfrm>
           <a:prstGeom prst="rect">
@@ -8118,7 +8118,7 @@
             <a:pPr algn="ctr"/>
             <a:r>
               <a:rPr lang="en-GB" sz="1200" b="1" dirty="0"/>
-              <a:t>40 Cells – 640 (0x280) bytes</a:t>
+              <a:t>40 Characters/80 Cells – 640 (0x280) bytes</a:t>
             </a:r>
           </a:p>
         </p:txBody>
@@ -8137,7 +8137,7 @@
         </p:nvSpPr>
         <p:spPr>
           <a:xfrm>
-            <a:off x="2154660" y="3148366"/>
+            <a:off x="1506588" y="3133267"/>
             <a:ext cx="953550" cy="276999"/>
           </a:xfrm>
           <a:prstGeom prst="rect">
@@ -8175,7 +8175,7 @@
         </p:nvCxnSpPr>
         <p:spPr>
           <a:xfrm flipV="1">
-            <a:off x="4031467" y="1484186"/>
+            <a:off x="3383395" y="1469087"/>
             <a:ext cx="535137" cy="597832"/>
           </a:xfrm>
           <a:prstGeom prst="straightConnector1">
@@ -8217,7 +8217,7 @@
         </p:nvGrpSpPr>
         <p:grpSpPr>
           <a:xfrm>
-            <a:off x="8959372" y="1166123"/>
+            <a:off x="8311300" y="1151024"/>
             <a:ext cx="878207" cy="1276831"/>
             <a:chOff x="4079775" y="3429000"/>
             <a:chExt cx="878207" cy="1276831"/>
@@ -8417,7 +8417,7 @@
         </p:nvGrpSpPr>
         <p:grpSpPr>
           <a:xfrm>
-            <a:off x="8945255" y="4349811"/>
+            <a:off x="8297183" y="4334712"/>
             <a:ext cx="878207" cy="1276831"/>
             <a:chOff x="4079775" y="3429000"/>
             <a:chExt cx="878207" cy="1276831"/>
@@ -8617,7 +8617,7 @@
         </p:nvSpPr>
         <p:spPr>
           <a:xfrm>
-            <a:off x="8832304" y="5805751"/>
+            <a:off x="8184232" y="5790652"/>
             <a:ext cx="433425" cy="276999"/>
           </a:xfrm>
           <a:prstGeom prst="rect">
@@ -8634,7 +8634,7 @@
             <a:pPr algn="r"/>
             <a:r>
               <a:rPr lang="en-GB" sz="1200" b="1" dirty="0"/>
-              <a:t>??</a:t>
+              <a:t>315</a:t>
             </a:r>
           </a:p>
         </p:txBody>
@@ -8655,7 +8655,7 @@
         </p:nvCxnSpPr>
         <p:spPr>
           <a:xfrm flipV="1">
-            <a:off x="8626142" y="4858517"/>
+            <a:off x="7978070" y="4843418"/>
             <a:ext cx="535137" cy="597832"/>
           </a:xfrm>
           <a:prstGeom prst="straightConnector1">
@@ -8684,59 +8684,6 @@
           </a:fontRef>
         </p:style>
       </p:cxnSp>
-      <p:sp>
-        <p:nvSpPr>
-          <p:cNvPr id="96" name="TextBox 95">
-            <a:extLst>
-              <a:ext uri="{FF2B5EF4-FFF2-40B4-BE49-F238E27FC236}">
-                <a16:creationId xmlns:a16="http://schemas.microsoft.com/office/drawing/2014/main" id="{33F51F82-00C5-4BFF-A8A2-479BCC86C667}"/>
-              </a:ext>
-            </a:extLst>
-          </p:cNvPr>
-          <p:cNvSpPr txBox="1"/>
-          <p:nvPr/>
-        </p:nvSpPr>
-        <p:spPr>
-          <a:xfrm>
-            <a:off x="315149" y="1018976"/>
-            <a:ext cx="1928213" cy="1110749"/>
-          </a:xfrm>
-          <a:prstGeom prst="rect">
-            <a:avLst/>
-          </a:prstGeom>
-          <a:noFill/>
-        </p:spPr>
-        <p:txBody>
-          <a:bodyPr wrap="none" rtlCol="0">
-            <a:noAutofit/>
-          </a:bodyPr>
-          <a:lstStyle/>
-          <a:p>
-            <a:r>
-              <a:rPr lang="en-GB" sz="1000" b="1" dirty="0"/>
-              <a:t>Notes</a:t>
-            </a:r>
-          </a:p>
-          <a:p>
-            <a:r>
-              <a:rPr lang="en-GB" sz="1000" dirty="0"/>
-              <a:t>Think of Y axis as flipped, then walk</a:t>
-            </a:r>
-          </a:p>
-          <a:p>
-            <a:r>
-              <a:rPr lang="en-GB" sz="1000" dirty="0"/>
-              <a:t> through memory from low to</a:t>
-            </a:r>
-          </a:p>
-          <a:p>
-            <a:r>
-              <a:rPr lang="en-GB" sz="1000" dirty="0"/>
-              <a:t>high as screen is draw </a:t>
-            </a:r>
-          </a:p>
-        </p:txBody>
-      </p:sp>
       <p:grpSp>
         <p:nvGrpSpPr>
           <p:cNvPr id="106" name="Group 105">
@@ -8751,7 +8698,7 @@
         </p:nvGrpSpPr>
         <p:grpSpPr>
           <a:xfrm>
-            <a:off x="5555676" y="3600316"/>
+            <a:off x="4907604" y="3585217"/>
             <a:ext cx="2877043" cy="330594"/>
             <a:chOff x="5396546" y="3094771"/>
             <a:chExt cx="2877043" cy="330594"/>
@@ -9260,7 +9207,7 @@
         </p:nvSpPr>
         <p:spPr>
           <a:xfrm>
-            <a:off x="5447928" y="3962359"/>
+            <a:off x="4799856" y="3947260"/>
             <a:ext cx="575794" cy="276999"/>
           </a:xfrm>
           <a:prstGeom prst="rect">
@@ -9297,7 +9244,7 @@
         </p:nvSpPr>
         <p:spPr>
           <a:xfrm>
-            <a:off x="7969610" y="3940476"/>
+            <a:off x="7321538" y="3925377"/>
             <a:ext cx="575794" cy="276999"/>
           </a:xfrm>
           <a:prstGeom prst="rect">
@@ -9334,7 +9281,7 @@
         </p:nvSpPr>
         <p:spPr>
           <a:xfrm>
-            <a:off x="5447928" y="3264568"/>
+            <a:off x="4799856" y="3249469"/>
             <a:ext cx="575794" cy="276999"/>
           </a:xfrm>
           <a:prstGeom prst="rect">
@@ -9370,7 +9317,7 @@
         </p:nvSpPr>
         <p:spPr>
           <a:xfrm>
-            <a:off x="7859933" y="3264568"/>
+            <a:off x="7211861" y="3249469"/>
             <a:ext cx="608133" cy="276999"/>
           </a:xfrm>
           <a:prstGeom prst="rect">
@@ -9406,7 +9353,7 @@
         </p:nvSpPr>
         <p:spPr>
           <a:xfrm>
-            <a:off x="6386246" y="3034686"/>
+            <a:off x="5738174" y="3019587"/>
             <a:ext cx="1152383" cy="461665"/>
           </a:xfrm>
           <a:prstGeom prst="rect">
@@ -9480,7 +9427,7 @@
         </p:nvCxnSpPr>
         <p:spPr>
           <a:xfrm flipV="1">
-            <a:off x="4326678" y="3967370"/>
+            <a:off x="3678606" y="3952271"/>
             <a:ext cx="1235653" cy="474001"/>
           </a:xfrm>
           <a:prstGeom prst="line">
@@ -9523,7 +9470,7 @@
         </p:nvCxnSpPr>
         <p:spPr>
           <a:xfrm flipV="1">
-            <a:off x="5190768" y="3930910"/>
+            <a:off x="4542696" y="3915811"/>
             <a:ext cx="3241951" cy="524019"/>
           </a:xfrm>
           <a:prstGeom prst="line">
@@ -9564,7 +9511,7 @@
         </p:nvSpPr>
         <p:spPr>
           <a:xfrm>
-            <a:off x="3326310" y="741977"/>
+            <a:off x="2678238" y="726878"/>
             <a:ext cx="857937" cy="276999"/>
           </a:xfrm>
           <a:prstGeom prst="rect">
@@ -9600,7 +9547,7 @@
         </p:nvSpPr>
         <p:spPr>
           <a:xfrm>
-            <a:off x="8996600" y="6259382"/>
+            <a:off x="8348528" y="6244283"/>
             <a:ext cx="857937" cy="276999"/>
           </a:xfrm>
           <a:prstGeom prst="rect">
@@ -9636,7 +9583,7 @@
         </p:nvGrpSpPr>
         <p:grpSpPr>
           <a:xfrm>
-            <a:off x="3383499" y="2513980"/>
+            <a:off x="2735427" y="2498881"/>
             <a:ext cx="878207" cy="1276831"/>
             <a:chOff x="4079775" y="3429000"/>
             <a:chExt cx="878207" cy="1276831"/>
@@ -9838,7 +9785,7 @@
         </p:nvCxnSpPr>
         <p:spPr>
           <a:xfrm flipH="1">
-            <a:off x="4333734" y="2326873"/>
+            <a:off x="3685662" y="2311774"/>
             <a:ext cx="4559976" cy="391711"/>
           </a:xfrm>
           <a:prstGeom prst="straightConnector1">
@@ -9880,7 +9827,7 @@
         </p:nvSpPr>
         <p:spPr>
           <a:xfrm>
-            <a:off x="6398074" y="5733256"/>
+            <a:off x="5750002" y="5718157"/>
             <a:ext cx="864090" cy="276999"/>
           </a:xfrm>
           <a:prstGeom prst="rect">
@@ -9928,7 +9875,7 @@
         </p:nvCxnSpPr>
         <p:spPr>
           <a:xfrm flipV="1">
-            <a:off x="5108981" y="4727559"/>
+            <a:off x="4460909" y="4712460"/>
             <a:ext cx="535137" cy="597832"/>
           </a:xfrm>
           <a:prstGeom prst="straightConnector1">
@@ -9973,7 +9920,7 @@
         </p:nvCxnSpPr>
         <p:spPr>
           <a:xfrm flipV="1">
-            <a:off x="5042836" y="1474072"/>
+            <a:off x="4394764" y="1458973"/>
             <a:ext cx="535137" cy="597832"/>
           </a:xfrm>
           <a:prstGeom prst="straightConnector1">
@@ -10018,7 +9965,7 @@
         </p:nvCxnSpPr>
         <p:spPr>
           <a:xfrm flipV="1">
-            <a:off x="8626142" y="1524033"/>
+            <a:off x="7978070" y="1508934"/>
             <a:ext cx="535137" cy="597832"/>
           </a:xfrm>
           <a:prstGeom prst="straightConnector1">
@@ -10061,7 +10008,7 @@
         </p:nvSpPr>
         <p:spPr>
           <a:xfrm>
-            <a:off x="2659218" y="3323317"/>
+            <a:off x="2011146" y="3308218"/>
             <a:ext cx="864090" cy="276999"/>
           </a:xfrm>
           <a:prstGeom prst="rect">
@@ -10089,6 +10036,91 @@
             <a:r>
               <a:rPr lang="en-GB" dirty="0"/>
               <a:t>…</a:t>
+            </a:r>
+          </a:p>
+        </p:txBody>
+      </p:sp>
+      <p:sp>
+        <p:nvSpPr>
+          <p:cNvPr id="2" name="Left Brace 1">
+            <a:extLst>
+              <a:ext uri="{FF2B5EF4-FFF2-40B4-BE49-F238E27FC236}">
+                <a16:creationId xmlns:a16="http://schemas.microsoft.com/office/drawing/2014/main" id="{C4CE9349-736B-4944-BC07-2440D703773A}"/>
+              </a:ext>
+            </a:extLst>
+          </p:cNvPr>
+          <p:cNvSpPr/>
+          <p:nvPr/>
+        </p:nvSpPr>
+        <p:spPr>
+          <a:xfrm rot="16200000">
+            <a:off x="3469687" y="5364798"/>
+            <a:ext cx="220957" cy="1761490"/>
+          </a:xfrm>
+          <a:prstGeom prst="leftBrace">
+            <a:avLst/>
+          </a:prstGeom>
+          <a:ln w="12700">
+            <a:solidFill>
+              <a:schemeClr val="tx1"/>
+            </a:solidFill>
+          </a:ln>
+        </p:spPr>
+        <p:style>
+          <a:lnRef idx="1">
+            <a:schemeClr val="accent1"/>
+          </a:lnRef>
+          <a:fillRef idx="0">
+            <a:schemeClr val="accent1"/>
+          </a:fillRef>
+          <a:effectRef idx="0">
+            <a:schemeClr val="accent1"/>
+          </a:effectRef>
+          <a:fontRef idx="minor">
+            <a:schemeClr val="tx1"/>
+          </a:fontRef>
+        </p:style>
+        <p:txBody>
+          <a:bodyPr rtlCol="0" anchor="ctr"/>
+          <a:lstStyle/>
+          <a:p>
+            <a:pPr algn="ctr"/>
+            <a:endParaRPr lang="en-GB"/>
+          </a:p>
+        </p:txBody>
+      </p:sp>
+      <p:sp>
+        <p:nvSpPr>
+          <p:cNvPr id="93" name="TextBox 92">
+            <a:extLst>
+              <a:ext uri="{FF2B5EF4-FFF2-40B4-BE49-F238E27FC236}">
+                <a16:creationId xmlns:a16="http://schemas.microsoft.com/office/drawing/2014/main" id="{5661398D-D916-463E-B2D5-9D9F87DC03E2}"/>
+              </a:ext>
+            </a:extLst>
+          </p:cNvPr>
+          <p:cNvSpPr txBox="1"/>
+          <p:nvPr/>
+        </p:nvSpPr>
+        <p:spPr>
+          <a:xfrm>
+            <a:off x="2755784" y="6420712"/>
+            <a:ext cx="1656184" cy="276999"/>
+          </a:xfrm>
+          <a:prstGeom prst="rect">
+            <a:avLst/>
+          </a:prstGeom>
+          <a:noFill/>
+        </p:spPr>
+        <p:txBody>
+          <a:bodyPr wrap="square" rtlCol="0">
+            <a:spAutoFit/>
+          </a:bodyPr>
+          <a:lstStyle/>
+          <a:p>
+            <a:pPr algn="ctr"/>
+            <a:r>
+              <a:rPr lang="en-GB" sz="1200" b="1" dirty="0"/>
+              <a:t>One character</a:t>
             </a:r>
           </a:p>
         </p:txBody>
@@ -10123,385 +10155,1805 @@
           <a:chExt cx="0" cy="0"/>
         </a:xfrm>
       </p:grpSpPr>
-      <p:graphicFrame>
-        <p:nvGraphicFramePr>
-          <p:cNvPr id="4" name="Table 4">
-            <a:extLst>
-              <a:ext uri="{FF2B5EF4-FFF2-40B4-BE49-F238E27FC236}">
-                <a16:creationId xmlns:a16="http://schemas.microsoft.com/office/drawing/2014/main" id="{D4D49F7B-2326-49D0-82E9-C3CDA64E567C}"/>
-              </a:ext>
-            </a:extLst>
-          </p:cNvPr>
-          <p:cNvGraphicFramePr>
-            <a:graphicFrameLocks noGrp="1"/>
-          </p:cNvGraphicFramePr>
-          <p:nvPr>
-            <p:extLst>
-              <p:ext uri="{D42A27DB-BD31-4B8C-83A1-F6EECF244321}">
-                <p14:modId xmlns:p14="http://schemas.microsoft.com/office/powerpoint/2010/main" val="1404621391"/>
-              </p:ext>
-            </p:extLst>
-          </p:nvPr>
-        </p:nvGraphicFramePr>
-        <p:xfrm>
-          <a:off x="2032000" y="719666"/>
-          <a:ext cx="7376368" cy="1483360"/>
-        </p:xfrm>
-        <a:graphic>
-          <a:graphicData uri="http://schemas.openxmlformats.org/drawingml/2006/table">
-            <a:tbl>
-              <a:tblPr firstRow="1" bandRow="1">
-                <a:tableStyleId>{073A0DAA-6AF3-43AB-8588-CEC1D06C72B9}</a:tableStyleId>
-              </a:tblPr>
-              <a:tblGrid>
-                <a:gridCol w="1161143">
-                  <a:extLst>
-                    <a:ext uri="{9D8B030D-6E8A-4147-A177-3AD203B41FA5}">
-                      <a16:colId xmlns:a16="http://schemas.microsoft.com/office/drawing/2014/main" val="3002738835"/>
-                    </a:ext>
-                  </a:extLst>
-                </a:gridCol>
-                <a:gridCol w="1161143">
-                  <a:extLst>
-                    <a:ext uri="{9D8B030D-6E8A-4147-A177-3AD203B41FA5}">
-                      <a16:colId xmlns:a16="http://schemas.microsoft.com/office/drawing/2014/main" val="3086484081"/>
-                    </a:ext>
-                  </a:extLst>
-                </a:gridCol>
-                <a:gridCol w="1161143">
-                  <a:extLst>
-                    <a:ext uri="{9D8B030D-6E8A-4147-A177-3AD203B41FA5}">
-                      <a16:colId xmlns:a16="http://schemas.microsoft.com/office/drawing/2014/main" val="3453998561"/>
-                    </a:ext>
-                  </a:extLst>
-                </a:gridCol>
-                <a:gridCol w="1161143">
-                  <a:extLst>
-                    <a:ext uri="{9D8B030D-6E8A-4147-A177-3AD203B41FA5}">
-                      <a16:colId xmlns:a16="http://schemas.microsoft.com/office/drawing/2014/main" val="3099069514"/>
-                    </a:ext>
-                  </a:extLst>
-                </a:gridCol>
-                <a:gridCol w="2731796">
-                  <a:extLst>
-                    <a:ext uri="{9D8B030D-6E8A-4147-A177-3AD203B41FA5}">
-                      <a16:colId xmlns:a16="http://schemas.microsoft.com/office/drawing/2014/main" val="750439028"/>
-                    </a:ext>
-                  </a:extLst>
-                </a:gridCol>
-              </a:tblGrid>
-              <a:tr h="370840">
-                <a:tc>
-                  <a:txBody>
-                    <a:bodyPr/>
-                    <a:lstStyle/>
-                    <a:p>
-                      <a:r>
-                        <a:rPr lang="en-GB" dirty="0"/>
-                        <a:t>X</a:t>
-                      </a:r>
-                    </a:p>
-                  </a:txBody>
-                  <a:tcPr/>
-                </a:tc>
-                <a:tc>
-                  <a:txBody>
-                    <a:bodyPr/>
-                    <a:lstStyle/>
-                    <a:p>
-                      <a:r>
-                        <a:rPr lang="en-GB" dirty="0"/>
-                        <a:t>Y</a:t>
-                      </a:r>
-                    </a:p>
-                  </a:txBody>
-                  <a:tcPr/>
-                </a:tc>
-                <a:tc>
-                  <a:txBody>
-                    <a:bodyPr/>
-                    <a:lstStyle/>
-                    <a:p>
-                      <a:r>
-                        <a:rPr lang="en-GB" dirty="0"/>
-                        <a:t>Colour</a:t>
-                      </a:r>
-                    </a:p>
-                  </a:txBody>
-                  <a:tcPr/>
-                </a:tc>
-                <a:tc>
-                  <a:txBody>
-                    <a:bodyPr/>
-                    <a:lstStyle/>
-                    <a:p>
-                      <a:r>
-                        <a:rPr lang="en-GB" dirty="0"/>
-                        <a:t>Address</a:t>
-                      </a:r>
-                    </a:p>
-                  </a:txBody>
-                  <a:tcPr/>
-                </a:tc>
-                <a:tc>
-                  <a:txBody>
-                    <a:bodyPr/>
-                    <a:lstStyle/>
-                    <a:p>
-                      <a:r>
-                        <a:rPr lang="en-GB" dirty="0"/>
-                        <a:t>Value</a:t>
-                      </a:r>
-                    </a:p>
-                  </a:txBody>
-                  <a:tcPr/>
-                </a:tc>
+      <p:grpSp>
+        <p:nvGrpSpPr>
+          <p:cNvPr id="48" name="Group 47">
+            <a:extLst>
+              <a:ext uri="{FF2B5EF4-FFF2-40B4-BE49-F238E27FC236}">
+                <a16:creationId xmlns:a16="http://schemas.microsoft.com/office/drawing/2014/main" id="{EBCB513C-A2B1-4C4A-A895-D75448DE9A18}"/>
+              </a:ext>
+            </a:extLst>
+          </p:cNvPr>
+          <p:cNvGrpSpPr/>
+          <p:nvPr/>
+        </p:nvGrpSpPr>
+        <p:grpSpPr>
+          <a:xfrm>
+            <a:off x="4295800" y="1700808"/>
+            <a:ext cx="4489520" cy="3001656"/>
+            <a:chOff x="4560828" y="1918109"/>
+            <a:chExt cx="4489520" cy="3001656"/>
+          </a:xfrm>
+        </p:grpSpPr>
+        <p:grpSp>
+          <p:nvGrpSpPr>
+            <p:cNvPr id="33" name="Group 32">
+              <a:extLst>
+                <a:ext uri="{FF2B5EF4-FFF2-40B4-BE49-F238E27FC236}">
+                  <a16:creationId xmlns:a16="http://schemas.microsoft.com/office/drawing/2014/main" id="{DF3CBF9C-42DC-476D-9CBE-28077298D285}"/>
+                </a:ext>
+              </a:extLst>
+            </p:cNvPr>
+            <p:cNvGrpSpPr/>
+            <p:nvPr/>
+          </p:nvGrpSpPr>
+          <p:grpSpPr>
+            <a:xfrm>
+              <a:off x="4657478" y="3212976"/>
+              <a:ext cx="2877043" cy="330594"/>
+              <a:chOff x="2927648" y="2708920"/>
+              <a:chExt cx="2877043" cy="330594"/>
+            </a:xfrm>
+          </p:grpSpPr>
+          <p:sp>
+            <p:nvSpPr>
+              <p:cNvPr id="5" name="Rectangle 4">
                 <a:extLst>
-                  <a:ext uri="{0D108BD9-81ED-4DB2-BD59-A6C34878D82A}">
-                    <a16:rowId xmlns:a16="http://schemas.microsoft.com/office/drawing/2014/main" val="1887093686"/>
+                  <a:ext uri="{FF2B5EF4-FFF2-40B4-BE49-F238E27FC236}">
+                    <a16:creationId xmlns:a16="http://schemas.microsoft.com/office/drawing/2014/main" id="{DCC231AF-CE21-4216-9653-D555B97AADBD}"/>
                   </a:ext>
                 </a:extLst>
-              </a:tr>
-              <a:tr h="370840">
-                <a:tc>
-                  <a:txBody>
-                    <a:bodyPr/>
-                    <a:lstStyle/>
-                    <a:p>
-                      <a:r>
-                        <a:rPr lang="en-GB" dirty="0"/>
-                        <a:t>0</a:t>
-                      </a:r>
-                    </a:p>
-                  </a:txBody>
-                  <a:tcPr/>
-                </a:tc>
-                <a:tc>
-                  <a:txBody>
-                    <a:bodyPr/>
-                    <a:lstStyle/>
-                    <a:p>
-                      <a:r>
-                        <a:rPr lang="en-GB" dirty="0"/>
-                        <a:t>0</a:t>
-                      </a:r>
-                    </a:p>
-                  </a:txBody>
-                  <a:tcPr/>
-                </a:tc>
-                <a:tc>
-                  <a:txBody>
-                    <a:bodyPr/>
-                    <a:lstStyle/>
-                    <a:p>
-                      <a:r>
-                        <a:rPr lang="en-GB" dirty="0"/>
-                        <a:t>1</a:t>
-                      </a:r>
-                    </a:p>
-                  </a:txBody>
-                  <a:tcPr/>
-                </a:tc>
-                <a:tc>
-                  <a:txBody>
-                    <a:bodyPr/>
-                    <a:lstStyle/>
-                    <a:p>
-                      <a:pPr marL="0" marR="0" lvl="0" indent="0" algn="l" defTabSz="914400" rtl="0" eaLnBrk="1" fontAlgn="auto" latinLnBrk="0" hangingPunct="1">
-                        <a:lnSpc>
-                          <a:spcPct val="100000"/>
-                        </a:lnSpc>
-                        <a:spcBef>
-                          <a:spcPts val="0"/>
-                        </a:spcBef>
-                        <a:spcAft>
-                          <a:spcPts val="0"/>
-                        </a:spcAft>
-                        <a:buClrTx/>
-                        <a:buSzTx/>
-                        <a:buFontTx/>
-                        <a:buNone/>
-                        <a:tabLst/>
-                        <a:defRPr/>
-                      </a:pPr>
-                      <a:r>
-                        <a:rPr lang="en-GB" dirty="0"/>
-                        <a:t>0x7D87</a:t>
-                      </a:r>
-                    </a:p>
-                  </a:txBody>
-                  <a:tcPr/>
-                </a:tc>
-                <a:tc>
-                  <a:txBody>
-                    <a:bodyPr/>
-                    <a:lstStyle/>
-                    <a:p>
-                      <a:r>
-                        <a:rPr lang="en-GB" dirty="0"/>
-                        <a:t>8</a:t>
-                      </a:r>
-                    </a:p>
-                  </a:txBody>
-                  <a:tcPr/>
-                </a:tc>
+              </p:cNvPr>
+              <p:cNvSpPr/>
+              <p:nvPr/>
+            </p:nvSpPr>
+            <p:spPr>
+              <a:xfrm>
+                <a:off x="2927648" y="2708920"/>
+                <a:ext cx="360298" cy="330594"/>
+              </a:xfrm>
+              <a:prstGeom prst="rect">
+                <a:avLst/>
+              </a:prstGeom>
+              <a:solidFill>
+                <a:schemeClr val="tx1">
+                  <a:lumMod val="65000"/>
+                  <a:lumOff val="35000"/>
+                </a:schemeClr>
+              </a:solidFill>
+              <a:ln w="6350"/>
+            </p:spPr>
+            <p:style>
+              <a:lnRef idx="2">
+                <a:schemeClr val="accent1">
+                  <a:shade val="50000"/>
+                </a:schemeClr>
+              </a:lnRef>
+              <a:fillRef idx="1">
+                <a:schemeClr val="accent1"/>
+              </a:fillRef>
+              <a:effectRef idx="0">
+                <a:schemeClr val="accent1"/>
+              </a:effectRef>
+              <a:fontRef idx="minor">
+                <a:schemeClr val="lt1"/>
+              </a:fontRef>
+            </p:style>
+            <p:txBody>
+              <a:bodyPr rtlCol="0" anchor="ctr"/>
+              <a:lstStyle/>
+              <a:p>
+                <a:pPr algn="ctr"/>
+                <a:r>
+                  <a:rPr lang="en-GB" sz="1200" b="1" dirty="0">
+                    <a:solidFill>
+                      <a:schemeClr val="bg1"/>
+                    </a:solidFill>
+                    <a:latin typeface="Courier New" panose="02070309020205020404" pitchFamily="49" charset="0"/>
+                    <a:cs typeface="Courier New" panose="02070309020205020404" pitchFamily="49" charset="0"/>
+                  </a:rPr>
+                  <a:t>7</a:t>
+                </a:r>
+              </a:p>
+            </p:txBody>
+          </p:sp>
+          <p:sp>
+            <p:nvSpPr>
+              <p:cNvPr id="6" name="Rectangle 5">
                 <a:extLst>
-                  <a:ext uri="{0D108BD9-81ED-4DB2-BD59-A6C34878D82A}">
-                    <a16:rowId xmlns:a16="http://schemas.microsoft.com/office/drawing/2014/main" val="61781499"/>
+                  <a:ext uri="{FF2B5EF4-FFF2-40B4-BE49-F238E27FC236}">
+                    <a16:creationId xmlns:a16="http://schemas.microsoft.com/office/drawing/2014/main" id="{493184CA-4290-4229-B28F-85708457A7D2}"/>
                   </a:ext>
                 </a:extLst>
-              </a:tr>
-              <a:tr h="370840">
-                <a:tc>
-                  <a:txBody>
-                    <a:bodyPr/>
-                    <a:lstStyle/>
-                    <a:p>
-                      <a:r>
-                        <a:rPr lang="en-GB" dirty="0"/>
-                        <a:t>0</a:t>
-                      </a:r>
-                    </a:p>
-                  </a:txBody>
-                  <a:tcPr/>
-                </a:tc>
-                <a:tc>
-                  <a:txBody>
-                    <a:bodyPr/>
-                    <a:lstStyle/>
-                    <a:p>
-                      <a:r>
-                        <a:rPr lang="en-GB" dirty="0"/>
-                        <a:t>16 (4X4)</a:t>
-                      </a:r>
-                    </a:p>
-                  </a:txBody>
-                  <a:tcPr/>
-                </a:tc>
-                <a:tc>
-                  <a:txBody>
-                    <a:bodyPr/>
-                    <a:lstStyle/>
-                    <a:p>
-                      <a:r>
-                        <a:rPr lang="en-GB" dirty="0"/>
-                        <a:t>1</a:t>
-                      </a:r>
-                    </a:p>
-                  </a:txBody>
-                  <a:tcPr/>
-                </a:tc>
-                <a:tc>
-                  <a:txBody>
-                    <a:bodyPr/>
-                    <a:lstStyle/>
-                    <a:p>
-                      <a:r>
-                        <a:rPr lang="en-GB" dirty="0"/>
-                        <a:t>0X7D83</a:t>
-                      </a:r>
-                    </a:p>
-                  </a:txBody>
-                  <a:tcPr/>
-                </a:tc>
-                <a:tc>
-                  <a:txBody>
-                    <a:bodyPr/>
-                    <a:lstStyle/>
-                    <a:p>
-                      <a:r>
-                        <a:rPr lang="en-GB" dirty="0"/>
-                        <a:t>8</a:t>
-                      </a:r>
-                    </a:p>
-                  </a:txBody>
-                  <a:tcPr/>
-                </a:tc>
+              </p:cNvPr>
+              <p:cNvSpPr/>
+              <p:nvPr/>
+            </p:nvSpPr>
+            <p:spPr>
+              <a:xfrm>
+                <a:off x="3287183" y="2708920"/>
+                <a:ext cx="360298" cy="330594"/>
+              </a:xfrm>
+              <a:prstGeom prst="rect">
+                <a:avLst/>
+              </a:prstGeom>
+              <a:solidFill>
+                <a:srgbClr val="FF0000"/>
+              </a:solidFill>
+              <a:ln w="6350"/>
+            </p:spPr>
+            <p:style>
+              <a:lnRef idx="2">
+                <a:schemeClr val="accent1">
+                  <a:shade val="50000"/>
+                </a:schemeClr>
+              </a:lnRef>
+              <a:fillRef idx="1">
+                <a:schemeClr val="accent1"/>
+              </a:fillRef>
+              <a:effectRef idx="0">
+                <a:schemeClr val="accent1"/>
+              </a:effectRef>
+              <a:fontRef idx="minor">
+                <a:schemeClr val="lt1"/>
+              </a:fontRef>
+            </p:style>
+            <p:txBody>
+              <a:bodyPr rtlCol="0" anchor="ctr"/>
+              <a:lstStyle/>
+              <a:p>
+                <a:pPr algn="ctr"/>
+                <a:r>
+                  <a:rPr lang="en-GB" sz="1200" b="1" dirty="0">
+                    <a:solidFill>
+                      <a:schemeClr val="bg1"/>
+                    </a:solidFill>
+                    <a:latin typeface="Courier New" panose="02070309020205020404" pitchFamily="49" charset="0"/>
+                    <a:cs typeface="Courier New" panose="02070309020205020404" pitchFamily="49" charset="0"/>
+                  </a:rPr>
+                  <a:t>6</a:t>
+                </a:r>
+              </a:p>
+            </p:txBody>
+          </p:sp>
+          <p:sp>
+            <p:nvSpPr>
+              <p:cNvPr id="7" name="Rectangle 6">
                 <a:extLst>
-                  <a:ext uri="{0D108BD9-81ED-4DB2-BD59-A6C34878D82A}">
-                    <a16:rowId xmlns:a16="http://schemas.microsoft.com/office/drawing/2014/main" val="3559174397"/>
+                  <a:ext uri="{FF2B5EF4-FFF2-40B4-BE49-F238E27FC236}">
+                    <a16:creationId xmlns:a16="http://schemas.microsoft.com/office/drawing/2014/main" id="{AC5D4B73-2B8F-4E9A-BD81-6FA69A14E97C}"/>
                   </a:ext>
                 </a:extLst>
-              </a:tr>
-              <a:tr h="370840">
-                <a:tc>
-                  <a:txBody>
-                    <a:bodyPr/>
-                    <a:lstStyle/>
-                    <a:p>
-                      <a:r>
-                        <a:rPr lang="en-GB" dirty="0"/>
-                        <a:t>0</a:t>
-                      </a:r>
-                    </a:p>
-                  </a:txBody>
-                  <a:tcPr/>
-                </a:tc>
-                <a:tc>
-                  <a:txBody>
-                    <a:bodyPr/>
-                    <a:lstStyle/>
-                    <a:p>
-                      <a:r>
-                        <a:rPr lang="en-GB" dirty="0"/>
-                        <a:t>32 (8X4)</a:t>
-                      </a:r>
-                    </a:p>
-                  </a:txBody>
-                  <a:tcPr/>
-                </a:tc>
-                <a:tc>
-                  <a:txBody>
-                    <a:bodyPr/>
-                    <a:lstStyle/>
-                    <a:p>
-                      <a:r>
-                        <a:rPr lang="en-GB" dirty="0"/>
-                        <a:t>1</a:t>
-                      </a:r>
-                    </a:p>
-                  </a:txBody>
-                  <a:tcPr/>
-                </a:tc>
-                <a:tc>
-                  <a:txBody>
-                    <a:bodyPr/>
-                    <a:lstStyle/>
-                    <a:p>
-                      <a:r>
-                        <a:rPr lang="en-GB" dirty="0"/>
-                        <a:t>0X7B07</a:t>
-                      </a:r>
-                    </a:p>
-                  </a:txBody>
-                  <a:tcPr/>
-                </a:tc>
-                <a:tc>
-                  <a:txBody>
-                    <a:bodyPr/>
-                    <a:lstStyle/>
-                    <a:p>
-                      <a:endParaRPr lang="en-GB" dirty="0"/>
-                    </a:p>
-                  </a:txBody>
-                  <a:tcPr/>
-                </a:tc>
+              </p:cNvPr>
+              <p:cNvSpPr/>
+              <p:nvPr/>
+            </p:nvSpPr>
+            <p:spPr>
+              <a:xfrm>
+                <a:off x="3646718" y="2708920"/>
+                <a:ext cx="360298" cy="330594"/>
+              </a:xfrm>
+              <a:prstGeom prst="rect">
+                <a:avLst/>
+              </a:prstGeom>
+              <a:solidFill>
+                <a:srgbClr val="00B050"/>
+              </a:solidFill>
+              <a:ln w="6350"/>
+            </p:spPr>
+            <p:style>
+              <a:lnRef idx="2">
+                <a:schemeClr val="accent1">
+                  <a:shade val="50000"/>
+                </a:schemeClr>
+              </a:lnRef>
+              <a:fillRef idx="1">
+                <a:schemeClr val="accent1"/>
+              </a:fillRef>
+              <a:effectRef idx="0">
+                <a:schemeClr val="accent1"/>
+              </a:effectRef>
+              <a:fontRef idx="minor">
+                <a:schemeClr val="lt1"/>
+              </a:fontRef>
+            </p:style>
+            <p:txBody>
+              <a:bodyPr rtlCol="0" anchor="ctr"/>
+              <a:lstStyle/>
+              <a:p>
+                <a:pPr algn="ctr"/>
+                <a:r>
+                  <a:rPr lang="en-GB" sz="1200" b="1" dirty="0">
+                    <a:solidFill>
+                      <a:schemeClr val="bg1"/>
+                    </a:solidFill>
+                    <a:latin typeface="Courier New" panose="02070309020205020404" pitchFamily="49" charset="0"/>
+                    <a:cs typeface="Courier New" panose="02070309020205020404" pitchFamily="49" charset="0"/>
+                  </a:rPr>
+                  <a:t>5</a:t>
+                </a:r>
+              </a:p>
+            </p:txBody>
+          </p:sp>
+          <p:sp>
+            <p:nvSpPr>
+              <p:cNvPr id="8" name="Rectangle 7">
                 <a:extLst>
-                  <a:ext uri="{0D108BD9-81ED-4DB2-BD59-A6C34878D82A}">
-                    <a16:rowId xmlns:a16="http://schemas.microsoft.com/office/drawing/2014/main" val="3687812520"/>
+                  <a:ext uri="{FF2B5EF4-FFF2-40B4-BE49-F238E27FC236}">
+                    <a16:creationId xmlns:a16="http://schemas.microsoft.com/office/drawing/2014/main" id="{AD1F13BF-1FEB-43FE-B315-4B6670F37041}"/>
                   </a:ext>
                 </a:extLst>
-              </a:tr>
-            </a:tbl>
-          </a:graphicData>
-        </a:graphic>
-      </p:graphicFrame>
+              </p:cNvPr>
+              <p:cNvSpPr/>
+              <p:nvPr/>
+            </p:nvSpPr>
+            <p:spPr>
+              <a:xfrm>
+                <a:off x="4006253" y="2708920"/>
+                <a:ext cx="360298" cy="330594"/>
+              </a:xfrm>
+              <a:prstGeom prst="rect">
+                <a:avLst/>
+              </a:prstGeom>
+              <a:solidFill>
+                <a:srgbClr val="0070C0"/>
+              </a:solidFill>
+              <a:ln w="6350"/>
+            </p:spPr>
+            <p:style>
+              <a:lnRef idx="2">
+                <a:schemeClr val="accent1">
+                  <a:shade val="50000"/>
+                </a:schemeClr>
+              </a:lnRef>
+              <a:fillRef idx="1">
+                <a:schemeClr val="accent1"/>
+              </a:fillRef>
+              <a:effectRef idx="0">
+                <a:schemeClr val="accent1"/>
+              </a:effectRef>
+              <a:fontRef idx="minor">
+                <a:schemeClr val="lt1"/>
+              </a:fontRef>
+            </p:style>
+            <p:txBody>
+              <a:bodyPr rtlCol="0" anchor="ctr"/>
+              <a:lstStyle/>
+              <a:p>
+                <a:pPr algn="ctr"/>
+                <a:r>
+                  <a:rPr lang="en-GB" sz="1200" b="1" dirty="0">
+                    <a:solidFill>
+                      <a:schemeClr val="bg1"/>
+                    </a:solidFill>
+                    <a:latin typeface="Courier New" panose="02070309020205020404" pitchFamily="49" charset="0"/>
+                    <a:cs typeface="Courier New" panose="02070309020205020404" pitchFamily="49" charset="0"/>
+                  </a:rPr>
+                  <a:t>4</a:t>
+                </a:r>
+              </a:p>
+            </p:txBody>
+          </p:sp>
+          <p:sp>
+            <p:nvSpPr>
+              <p:cNvPr id="9" name="Rectangle 8">
+                <a:extLst>
+                  <a:ext uri="{FF2B5EF4-FFF2-40B4-BE49-F238E27FC236}">
+                    <a16:creationId xmlns:a16="http://schemas.microsoft.com/office/drawing/2014/main" id="{A1BF985B-A690-4C63-85A8-D13868110884}"/>
+                  </a:ext>
+                </a:extLst>
+              </p:cNvPr>
+              <p:cNvSpPr/>
+              <p:nvPr/>
+            </p:nvSpPr>
+            <p:spPr>
+              <a:xfrm>
+                <a:off x="4365788" y="2708920"/>
+                <a:ext cx="360298" cy="330594"/>
+              </a:xfrm>
+              <a:prstGeom prst="rect">
+                <a:avLst/>
+              </a:prstGeom>
+              <a:solidFill>
+                <a:schemeClr val="tx1">
+                  <a:lumMod val="65000"/>
+                  <a:lumOff val="35000"/>
+                </a:schemeClr>
+              </a:solidFill>
+              <a:ln w="6350"/>
+            </p:spPr>
+            <p:style>
+              <a:lnRef idx="2">
+                <a:schemeClr val="accent1">
+                  <a:shade val="50000"/>
+                </a:schemeClr>
+              </a:lnRef>
+              <a:fillRef idx="1">
+                <a:schemeClr val="accent1"/>
+              </a:fillRef>
+              <a:effectRef idx="0">
+                <a:schemeClr val="accent1"/>
+              </a:effectRef>
+              <a:fontRef idx="minor">
+                <a:schemeClr val="lt1"/>
+              </a:fontRef>
+            </p:style>
+            <p:txBody>
+              <a:bodyPr rtlCol="0" anchor="ctr"/>
+              <a:lstStyle/>
+              <a:p>
+                <a:pPr algn="ctr"/>
+                <a:r>
+                  <a:rPr lang="en-GB" sz="1200" b="1" dirty="0">
+                    <a:solidFill>
+                      <a:schemeClr val="bg1"/>
+                    </a:solidFill>
+                    <a:latin typeface="Courier New" panose="02070309020205020404" pitchFamily="49" charset="0"/>
+                    <a:cs typeface="Courier New" panose="02070309020205020404" pitchFamily="49" charset="0"/>
+                  </a:rPr>
+                  <a:t>3</a:t>
+                </a:r>
+              </a:p>
+            </p:txBody>
+          </p:sp>
+          <p:sp>
+            <p:nvSpPr>
+              <p:cNvPr id="10" name="Rectangle 9">
+                <a:extLst>
+                  <a:ext uri="{FF2B5EF4-FFF2-40B4-BE49-F238E27FC236}">
+                    <a16:creationId xmlns:a16="http://schemas.microsoft.com/office/drawing/2014/main" id="{E6848E58-2F1D-4284-BC35-D28C8C0966C4}"/>
+                  </a:ext>
+                </a:extLst>
+              </p:cNvPr>
+              <p:cNvSpPr/>
+              <p:nvPr/>
+            </p:nvSpPr>
+            <p:spPr>
+              <a:xfrm>
+                <a:off x="4725323" y="2708920"/>
+                <a:ext cx="360298" cy="330594"/>
+              </a:xfrm>
+              <a:prstGeom prst="rect">
+                <a:avLst/>
+              </a:prstGeom>
+              <a:solidFill>
+                <a:srgbClr val="FF0000"/>
+              </a:solidFill>
+              <a:ln w="6350"/>
+            </p:spPr>
+            <p:style>
+              <a:lnRef idx="2">
+                <a:schemeClr val="accent1">
+                  <a:shade val="50000"/>
+                </a:schemeClr>
+              </a:lnRef>
+              <a:fillRef idx="1">
+                <a:schemeClr val="accent1"/>
+              </a:fillRef>
+              <a:effectRef idx="0">
+                <a:schemeClr val="accent1"/>
+              </a:effectRef>
+              <a:fontRef idx="minor">
+                <a:schemeClr val="lt1"/>
+              </a:fontRef>
+            </p:style>
+            <p:txBody>
+              <a:bodyPr rtlCol="0" anchor="ctr"/>
+              <a:lstStyle/>
+              <a:p>
+                <a:pPr algn="ctr"/>
+                <a:r>
+                  <a:rPr lang="en-GB" sz="1200" b="1" dirty="0">
+                    <a:solidFill>
+                      <a:schemeClr val="bg1"/>
+                    </a:solidFill>
+                    <a:latin typeface="Courier New" panose="02070309020205020404" pitchFamily="49" charset="0"/>
+                    <a:cs typeface="Courier New" panose="02070309020205020404" pitchFamily="49" charset="0"/>
+                  </a:rPr>
+                  <a:t>2</a:t>
+                </a:r>
+              </a:p>
+            </p:txBody>
+          </p:sp>
+          <p:sp>
+            <p:nvSpPr>
+              <p:cNvPr id="11" name="Rectangle 10">
+                <a:extLst>
+                  <a:ext uri="{FF2B5EF4-FFF2-40B4-BE49-F238E27FC236}">
+                    <a16:creationId xmlns:a16="http://schemas.microsoft.com/office/drawing/2014/main" id="{A7DA1D57-3B44-4227-A566-17BEE74021C9}"/>
+                  </a:ext>
+                </a:extLst>
+              </p:cNvPr>
+              <p:cNvSpPr/>
+              <p:nvPr/>
+            </p:nvSpPr>
+            <p:spPr>
+              <a:xfrm>
+                <a:off x="5084858" y="2708920"/>
+                <a:ext cx="360298" cy="330594"/>
+              </a:xfrm>
+              <a:prstGeom prst="rect">
+                <a:avLst/>
+              </a:prstGeom>
+              <a:solidFill>
+                <a:srgbClr val="00B050"/>
+              </a:solidFill>
+              <a:ln w="6350"/>
+            </p:spPr>
+            <p:style>
+              <a:lnRef idx="2">
+                <a:schemeClr val="accent1">
+                  <a:shade val="50000"/>
+                </a:schemeClr>
+              </a:lnRef>
+              <a:fillRef idx="1">
+                <a:schemeClr val="accent1"/>
+              </a:fillRef>
+              <a:effectRef idx="0">
+                <a:schemeClr val="accent1"/>
+              </a:effectRef>
+              <a:fontRef idx="minor">
+                <a:schemeClr val="lt1"/>
+              </a:fontRef>
+            </p:style>
+            <p:txBody>
+              <a:bodyPr rtlCol="0" anchor="ctr"/>
+              <a:lstStyle/>
+              <a:p>
+                <a:pPr algn="ctr"/>
+                <a:r>
+                  <a:rPr lang="en-GB" sz="1200" b="1" dirty="0">
+                    <a:solidFill>
+                      <a:schemeClr val="bg1"/>
+                    </a:solidFill>
+                    <a:latin typeface="Courier New" panose="02070309020205020404" pitchFamily="49" charset="0"/>
+                    <a:cs typeface="Courier New" panose="02070309020205020404" pitchFamily="49" charset="0"/>
+                  </a:rPr>
+                  <a:t>1</a:t>
+                </a:r>
+              </a:p>
+            </p:txBody>
+          </p:sp>
+          <p:sp>
+            <p:nvSpPr>
+              <p:cNvPr id="12" name="Rectangle 11">
+                <a:extLst>
+                  <a:ext uri="{FF2B5EF4-FFF2-40B4-BE49-F238E27FC236}">
+                    <a16:creationId xmlns:a16="http://schemas.microsoft.com/office/drawing/2014/main" id="{B092DA1E-8B0F-44C3-B27F-AB5537379CAF}"/>
+                  </a:ext>
+                </a:extLst>
+              </p:cNvPr>
+              <p:cNvSpPr/>
+              <p:nvPr/>
+            </p:nvSpPr>
+            <p:spPr>
+              <a:xfrm>
+                <a:off x="5444393" y="2708920"/>
+                <a:ext cx="360298" cy="330594"/>
+              </a:xfrm>
+              <a:prstGeom prst="rect">
+                <a:avLst/>
+              </a:prstGeom>
+              <a:solidFill>
+                <a:srgbClr val="0070C0"/>
+              </a:solidFill>
+              <a:ln w="6350"/>
+            </p:spPr>
+            <p:style>
+              <a:lnRef idx="2">
+                <a:schemeClr val="accent1">
+                  <a:shade val="50000"/>
+                </a:schemeClr>
+              </a:lnRef>
+              <a:fillRef idx="1">
+                <a:schemeClr val="accent1"/>
+              </a:fillRef>
+              <a:effectRef idx="0">
+                <a:schemeClr val="accent1"/>
+              </a:effectRef>
+              <a:fontRef idx="minor">
+                <a:schemeClr val="lt1"/>
+              </a:fontRef>
+            </p:style>
+            <p:txBody>
+              <a:bodyPr rtlCol="0" anchor="ctr"/>
+              <a:lstStyle/>
+              <a:p>
+                <a:pPr algn="ctr"/>
+                <a:r>
+                  <a:rPr lang="en-GB" sz="1200" b="1" dirty="0">
+                    <a:solidFill>
+                      <a:schemeClr val="bg1"/>
+                    </a:solidFill>
+                    <a:latin typeface="Courier New" panose="02070309020205020404" pitchFamily="49" charset="0"/>
+                    <a:cs typeface="Courier New" panose="02070309020205020404" pitchFamily="49" charset="0"/>
+                  </a:rPr>
+                  <a:t>0</a:t>
+                </a:r>
+              </a:p>
+            </p:txBody>
+          </p:sp>
+        </p:grpSp>
+        <p:sp>
+          <p:nvSpPr>
+            <p:cNvPr id="13" name="TextBox 12">
+              <a:extLst>
+                <a:ext uri="{FF2B5EF4-FFF2-40B4-BE49-F238E27FC236}">
+                  <a16:creationId xmlns:a16="http://schemas.microsoft.com/office/drawing/2014/main" id="{694E639A-4F08-4A3C-9B65-1237E048AA6B}"/>
+                </a:ext>
+              </a:extLst>
+            </p:cNvPr>
+            <p:cNvSpPr txBox="1"/>
+            <p:nvPr/>
+          </p:nvSpPr>
+          <p:spPr>
+            <a:xfrm>
+              <a:off x="4560828" y="4642766"/>
+              <a:ext cx="575794" cy="276999"/>
+            </a:xfrm>
+            <a:prstGeom prst="rect">
+              <a:avLst/>
+            </a:prstGeom>
+            <a:noFill/>
+          </p:spPr>
+          <p:txBody>
+            <a:bodyPr wrap="square" rtlCol="0">
+              <a:spAutoFit/>
+            </a:bodyPr>
+            <a:lstStyle/>
+            <a:p>
+              <a:pPr algn="ctr"/>
+              <a:r>
+                <a:rPr lang="en-GB" sz="1200" b="1" dirty="0" err="1"/>
+                <a:t>MSb</a:t>
+              </a:r>
+              <a:endParaRPr lang="en-GB" sz="1200" b="1" dirty="0"/>
+            </a:p>
+          </p:txBody>
+        </p:sp>
+        <p:sp>
+          <p:nvSpPr>
+            <p:cNvPr id="14" name="TextBox 13">
+              <a:extLst>
+                <a:ext uri="{FF2B5EF4-FFF2-40B4-BE49-F238E27FC236}">
+                  <a16:creationId xmlns:a16="http://schemas.microsoft.com/office/drawing/2014/main" id="{4051BB5B-C22E-4634-88AB-079EA0C0246B}"/>
+                </a:ext>
+              </a:extLst>
+            </p:cNvPr>
+            <p:cNvSpPr txBox="1"/>
+            <p:nvPr/>
+          </p:nvSpPr>
+          <p:spPr>
+            <a:xfrm>
+              <a:off x="7066475" y="4642766"/>
+              <a:ext cx="575794" cy="276999"/>
+            </a:xfrm>
+            <a:prstGeom prst="rect">
+              <a:avLst/>
+            </a:prstGeom>
+            <a:noFill/>
+          </p:spPr>
+          <p:txBody>
+            <a:bodyPr wrap="square" rtlCol="0">
+              <a:spAutoFit/>
+            </a:bodyPr>
+            <a:lstStyle/>
+            <a:p>
+              <a:pPr algn="ctr"/>
+              <a:r>
+                <a:rPr lang="en-GB" sz="1200" b="1" dirty="0" err="1"/>
+                <a:t>LSb</a:t>
+              </a:r>
+              <a:endParaRPr lang="en-GB" sz="1200" b="1" dirty="0"/>
+            </a:p>
+          </p:txBody>
+        </p:sp>
+        <p:sp>
+          <p:nvSpPr>
+            <p:cNvPr id="15" name="TextBox 14">
+              <a:extLst>
+                <a:ext uri="{FF2B5EF4-FFF2-40B4-BE49-F238E27FC236}">
+                  <a16:creationId xmlns:a16="http://schemas.microsoft.com/office/drawing/2014/main" id="{FF465BA0-0FBA-4B53-9274-825835CAB1C9}"/>
+                </a:ext>
+              </a:extLst>
+            </p:cNvPr>
+            <p:cNvSpPr txBox="1"/>
+            <p:nvPr/>
+          </p:nvSpPr>
+          <p:spPr>
+            <a:xfrm>
+              <a:off x="4584877" y="1918110"/>
+              <a:ext cx="575794" cy="276999"/>
+            </a:xfrm>
+            <a:prstGeom prst="rect">
+              <a:avLst/>
+            </a:prstGeom>
+            <a:noFill/>
+          </p:spPr>
+          <p:txBody>
+            <a:bodyPr wrap="square" rtlCol="0">
+              <a:spAutoFit/>
+            </a:bodyPr>
+            <a:lstStyle/>
+            <a:p>
+              <a:pPr algn="ctr"/>
+              <a:r>
+                <a:rPr lang="en-GB" sz="1200" b="1" dirty="0"/>
+                <a:t>Low X</a:t>
+              </a:r>
+            </a:p>
+          </p:txBody>
+        </p:sp>
+        <p:sp>
+          <p:nvSpPr>
+            <p:cNvPr id="16" name="TextBox 15">
+              <a:extLst>
+                <a:ext uri="{FF2B5EF4-FFF2-40B4-BE49-F238E27FC236}">
+                  <a16:creationId xmlns:a16="http://schemas.microsoft.com/office/drawing/2014/main" id="{1D68478A-56A3-451A-A25D-BE041B6697CC}"/>
+                </a:ext>
+              </a:extLst>
+            </p:cNvPr>
+            <p:cNvSpPr txBox="1"/>
+            <p:nvPr/>
+          </p:nvSpPr>
+          <p:spPr>
+            <a:xfrm>
+              <a:off x="6870156" y="1918109"/>
+              <a:ext cx="608133" cy="276999"/>
+            </a:xfrm>
+            <a:prstGeom prst="rect">
+              <a:avLst/>
+            </a:prstGeom>
+            <a:noFill/>
+          </p:spPr>
+          <p:txBody>
+            <a:bodyPr wrap="square" rtlCol="0">
+              <a:spAutoFit/>
+            </a:bodyPr>
+            <a:lstStyle/>
+            <a:p>
+              <a:pPr algn="ctr"/>
+              <a:r>
+                <a:rPr lang="en-GB" sz="1200" b="1" dirty="0"/>
+                <a:t>High X</a:t>
+              </a:r>
+            </a:p>
+          </p:txBody>
+        </p:sp>
+        <p:grpSp>
+          <p:nvGrpSpPr>
+            <p:cNvPr id="34" name="Group 33">
+              <a:extLst>
+                <a:ext uri="{FF2B5EF4-FFF2-40B4-BE49-F238E27FC236}">
+                  <a16:creationId xmlns:a16="http://schemas.microsoft.com/office/drawing/2014/main" id="{E41A942D-2BC4-47C6-97E0-E2DA06465B50}"/>
+                </a:ext>
+              </a:extLst>
+            </p:cNvPr>
+            <p:cNvGrpSpPr/>
+            <p:nvPr/>
+          </p:nvGrpSpPr>
+          <p:grpSpPr>
+            <a:xfrm>
+              <a:off x="4657478" y="2331867"/>
+              <a:ext cx="2877043" cy="330594"/>
+              <a:chOff x="2927648" y="2024266"/>
+              <a:chExt cx="2877043" cy="330594"/>
+            </a:xfrm>
+          </p:grpSpPr>
+          <p:sp>
+            <p:nvSpPr>
+              <p:cNvPr id="17" name="Rectangle 16">
+                <a:extLst>
+                  <a:ext uri="{FF2B5EF4-FFF2-40B4-BE49-F238E27FC236}">
+                    <a16:creationId xmlns:a16="http://schemas.microsoft.com/office/drawing/2014/main" id="{8F2DCB69-7B55-433F-9C4E-0A30CE42D624}"/>
+                  </a:ext>
+                </a:extLst>
+              </p:cNvPr>
+              <p:cNvSpPr/>
+              <p:nvPr/>
+            </p:nvSpPr>
+            <p:spPr>
+              <a:xfrm>
+                <a:off x="2927648" y="2024266"/>
+                <a:ext cx="360298" cy="330594"/>
+              </a:xfrm>
+              <a:prstGeom prst="rect">
+                <a:avLst/>
+              </a:prstGeom>
+              <a:solidFill>
+                <a:schemeClr val="tx1">
+                  <a:lumMod val="65000"/>
+                  <a:lumOff val="35000"/>
+                </a:schemeClr>
+              </a:solidFill>
+              <a:ln w="6350"/>
+            </p:spPr>
+            <p:style>
+              <a:lnRef idx="2">
+                <a:schemeClr val="accent1">
+                  <a:shade val="50000"/>
+                </a:schemeClr>
+              </a:lnRef>
+              <a:fillRef idx="1">
+                <a:schemeClr val="accent1"/>
+              </a:fillRef>
+              <a:effectRef idx="0">
+                <a:schemeClr val="accent1"/>
+              </a:effectRef>
+              <a:fontRef idx="minor">
+                <a:schemeClr val="lt1"/>
+              </a:fontRef>
+            </p:style>
+            <p:txBody>
+              <a:bodyPr rtlCol="0" anchor="ctr"/>
+              <a:lstStyle/>
+              <a:p>
+                <a:pPr algn="ctr"/>
+                <a:r>
+                  <a:rPr lang="en-GB" sz="1200" b="1" dirty="0">
+                    <a:solidFill>
+                      <a:schemeClr val="bg1"/>
+                    </a:solidFill>
+                    <a:latin typeface="Courier New" panose="02070309020205020404" pitchFamily="49" charset="0"/>
+                    <a:cs typeface="Courier New" panose="02070309020205020404" pitchFamily="49" charset="0"/>
+                  </a:rPr>
+                  <a:t>7</a:t>
+                </a:r>
+              </a:p>
+            </p:txBody>
+          </p:sp>
+          <p:sp>
+            <p:nvSpPr>
+              <p:cNvPr id="18" name="Rectangle 17">
+                <a:extLst>
+                  <a:ext uri="{FF2B5EF4-FFF2-40B4-BE49-F238E27FC236}">
+                    <a16:creationId xmlns:a16="http://schemas.microsoft.com/office/drawing/2014/main" id="{C4612608-0B17-421E-84F9-4D19108319D2}"/>
+                  </a:ext>
+                </a:extLst>
+              </p:cNvPr>
+              <p:cNvSpPr/>
+              <p:nvPr/>
+            </p:nvSpPr>
+            <p:spPr>
+              <a:xfrm>
+                <a:off x="3287183" y="2024266"/>
+                <a:ext cx="360298" cy="330594"/>
+              </a:xfrm>
+              <a:prstGeom prst="rect">
+                <a:avLst/>
+              </a:prstGeom>
+              <a:solidFill>
+                <a:schemeClr val="tx1">
+                  <a:lumMod val="65000"/>
+                  <a:lumOff val="35000"/>
+                </a:schemeClr>
+              </a:solidFill>
+              <a:ln w="6350"/>
+            </p:spPr>
+            <p:style>
+              <a:lnRef idx="2">
+                <a:schemeClr val="accent1">
+                  <a:shade val="50000"/>
+                </a:schemeClr>
+              </a:lnRef>
+              <a:fillRef idx="1">
+                <a:schemeClr val="accent1"/>
+              </a:fillRef>
+              <a:effectRef idx="0">
+                <a:schemeClr val="accent1"/>
+              </a:effectRef>
+              <a:fontRef idx="minor">
+                <a:schemeClr val="lt1"/>
+              </a:fontRef>
+            </p:style>
+            <p:txBody>
+              <a:bodyPr rtlCol="0" anchor="ctr"/>
+              <a:lstStyle/>
+              <a:p>
+                <a:pPr algn="ctr"/>
+                <a:r>
+                  <a:rPr lang="en-GB" sz="1200" b="1" dirty="0">
+                    <a:solidFill>
+                      <a:schemeClr val="bg1"/>
+                    </a:solidFill>
+                    <a:latin typeface="Courier New" panose="02070309020205020404" pitchFamily="49" charset="0"/>
+                    <a:cs typeface="Courier New" panose="02070309020205020404" pitchFamily="49" charset="0"/>
+                  </a:rPr>
+                  <a:t>6</a:t>
+                </a:r>
+              </a:p>
+            </p:txBody>
+          </p:sp>
+          <p:sp>
+            <p:nvSpPr>
+              <p:cNvPr id="19" name="Rectangle 18">
+                <a:extLst>
+                  <a:ext uri="{FF2B5EF4-FFF2-40B4-BE49-F238E27FC236}">
+                    <a16:creationId xmlns:a16="http://schemas.microsoft.com/office/drawing/2014/main" id="{25BE1BCD-499B-4776-8B23-F25269F1D748}"/>
+                  </a:ext>
+                </a:extLst>
+              </p:cNvPr>
+              <p:cNvSpPr/>
+              <p:nvPr/>
+            </p:nvSpPr>
+            <p:spPr>
+              <a:xfrm>
+                <a:off x="3646718" y="2024266"/>
+                <a:ext cx="360298" cy="330594"/>
+              </a:xfrm>
+              <a:prstGeom prst="rect">
+                <a:avLst/>
+              </a:prstGeom>
+              <a:solidFill>
+                <a:schemeClr val="tx1">
+                  <a:lumMod val="65000"/>
+                  <a:lumOff val="35000"/>
+                </a:schemeClr>
+              </a:solidFill>
+              <a:ln w="6350"/>
+            </p:spPr>
+            <p:style>
+              <a:lnRef idx="2">
+                <a:schemeClr val="accent1">
+                  <a:shade val="50000"/>
+                </a:schemeClr>
+              </a:lnRef>
+              <a:fillRef idx="1">
+                <a:schemeClr val="accent1"/>
+              </a:fillRef>
+              <a:effectRef idx="0">
+                <a:schemeClr val="accent1"/>
+              </a:effectRef>
+              <a:fontRef idx="minor">
+                <a:schemeClr val="lt1"/>
+              </a:fontRef>
+            </p:style>
+            <p:txBody>
+              <a:bodyPr rtlCol="0" anchor="ctr"/>
+              <a:lstStyle/>
+              <a:p>
+                <a:pPr algn="ctr"/>
+                <a:r>
+                  <a:rPr lang="en-GB" sz="1200" b="1" dirty="0">
+                    <a:solidFill>
+                      <a:schemeClr val="bg1"/>
+                    </a:solidFill>
+                    <a:latin typeface="Courier New" panose="02070309020205020404" pitchFamily="49" charset="0"/>
+                    <a:cs typeface="Courier New" panose="02070309020205020404" pitchFamily="49" charset="0"/>
+                  </a:rPr>
+                  <a:t>5</a:t>
+                </a:r>
+              </a:p>
+            </p:txBody>
+          </p:sp>
+          <p:sp>
+            <p:nvSpPr>
+              <p:cNvPr id="20" name="Rectangle 19">
+                <a:extLst>
+                  <a:ext uri="{FF2B5EF4-FFF2-40B4-BE49-F238E27FC236}">
+                    <a16:creationId xmlns:a16="http://schemas.microsoft.com/office/drawing/2014/main" id="{19427876-518F-4303-AC8E-CECF8EABF82F}"/>
+                  </a:ext>
+                </a:extLst>
+              </p:cNvPr>
+              <p:cNvSpPr/>
+              <p:nvPr/>
+            </p:nvSpPr>
+            <p:spPr>
+              <a:xfrm>
+                <a:off x="4006253" y="2024266"/>
+                <a:ext cx="360298" cy="330594"/>
+              </a:xfrm>
+              <a:prstGeom prst="rect">
+                <a:avLst/>
+              </a:prstGeom>
+              <a:solidFill>
+                <a:schemeClr val="tx1">
+                  <a:lumMod val="65000"/>
+                  <a:lumOff val="35000"/>
+                </a:schemeClr>
+              </a:solidFill>
+              <a:ln w="6350"/>
+            </p:spPr>
+            <p:style>
+              <a:lnRef idx="2">
+                <a:schemeClr val="accent1">
+                  <a:shade val="50000"/>
+                </a:schemeClr>
+              </a:lnRef>
+              <a:fillRef idx="1">
+                <a:schemeClr val="accent1"/>
+              </a:fillRef>
+              <a:effectRef idx="0">
+                <a:schemeClr val="accent1"/>
+              </a:effectRef>
+              <a:fontRef idx="minor">
+                <a:schemeClr val="lt1"/>
+              </a:fontRef>
+            </p:style>
+            <p:txBody>
+              <a:bodyPr rtlCol="0" anchor="ctr"/>
+              <a:lstStyle/>
+              <a:p>
+                <a:pPr algn="ctr"/>
+                <a:r>
+                  <a:rPr lang="en-GB" sz="1200" b="1" dirty="0">
+                    <a:solidFill>
+                      <a:schemeClr val="bg1"/>
+                    </a:solidFill>
+                    <a:latin typeface="Courier New" panose="02070309020205020404" pitchFamily="49" charset="0"/>
+                    <a:cs typeface="Courier New" panose="02070309020205020404" pitchFamily="49" charset="0"/>
+                  </a:rPr>
+                  <a:t>4</a:t>
+                </a:r>
+              </a:p>
+            </p:txBody>
+          </p:sp>
+          <p:sp>
+            <p:nvSpPr>
+              <p:cNvPr id="21" name="Rectangle 20">
+                <a:extLst>
+                  <a:ext uri="{FF2B5EF4-FFF2-40B4-BE49-F238E27FC236}">
+                    <a16:creationId xmlns:a16="http://schemas.microsoft.com/office/drawing/2014/main" id="{43B03F15-02BD-4915-9098-2FFB8736F689}"/>
+                  </a:ext>
+                </a:extLst>
+              </p:cNvPr>
+              <p:cNvSpPr/>
+              <p:nvPr/>
+            </p:nvSpPr>
+            <p:spPr>
+              <a:xfrm>
+                <a:off x="4365788" y="2024266"/>
+                <a:ext cx="360298" cy="330594"/>
+              </a:xfrm>
+              <a:prstGeom prst="rect">
+                <a:avLst/>
+              </a:prstGeom>
+              <a:solidFill>
+                <a:schemeClr val="tx1">
+                  <a:lumMod val="65000"/>
+                  <a:lumOff val="35000"/>
+                </a:schemeClr>
+              </a:solidFill>
+              <a:ln w="6350"/>
+            </p:spPr>
+            <p:style>
+              <a:lnRef idx="2">
+                <a:schemeClr val="accent1">
+                  <a:shade val="50000"/>
+                </a:schemeClr>
+              </a:lnRef>
+              <a:fillRef idx="1">
+                <a:schemeClr val="accent1"/>
+              </a:fillRef>
+              <a:effectRef idx="0">
+                <a:schemeClr val="accent1"/>
+              </a:effectRef>
+              <a:fontRef idx="minor">
+                <a:schemeClr val="lt1"/>
+              </a:fontRef>
+            </p:style>
+            <p:txBody>
+              <a:bodyPr rtlCol="0" anchor="ctr"/>
+              <a:lstStyle/>
+              <a:p>
+                <a:pPr algn="ctr"/>
+                <a:r>
+                  <a:rPr lang="en-GB" sz="1200" b="1" dirty="0">
+                    <a:solidFill>
+                      <a:schemeClr val="bg1"/>
+                    </a:solidFill>
+                    <a:latin typeface="Courier New" panose="02070309020205020404" pitchFamily="49" charset="0"/>
+                    <a:cs typeface="Courier New" panose="02070309020205020404" pitchFamily="49" charset="0"/>
+                  </a:rPr>
+                  <a:t>3</a:t>
+                </a:r>
+              </a:p>
+            </p:txBody>
+          </p:sp>
+          <p:sp>
+            <p:nvSpPr>
+              <p:cNvPr id="22" name="Rectangle 21">
+                <a:extLst>
+                  <a:ext uri="{FF2B5EF4-FFF2-40B4-BE49-F238E27FC236}">
+                    <a16:creationId xmlns:a16="http://schemas.microsoft.com/office/drawing/2014/main" id="{59EC24DE-27C0-480C-BD84-AB51EC60796D}"/>
+                  </a:ext>
+                </a:extLst>
+              </p:cNvPr>
+              <p:cNvSpPr/>
+              <p:nvPr/>
+            </p:nvSpPr>
+            <p:spPr>
+              <a:xfrm>
+                <a:off x="4725323" y="2024266"/>
+                <a:ext cx="360298" cy="330594"/>
+              </a:xfrm>
+              <a:prstGeom prst="rect">
+                <a:avLst/>
+              </a:prstGeom>
+              <a:solidFill>
+                <a:schemeClr val="tx1">
+                  <a:lumMod val="65000"/>
+                  <a:lumOff val="35000"/>
+                </a:schemeClr>
+              </a:solidFill>
+              <a:ln w="6350"/>
+            </p:spPr>
+            <p:style>
+              <a:lnRef idx="2">
+                <a:schemeClr val="accent1">
+                  <a:shade val="50000"/>
+                </a:schemeClr>
+              </a:lnRef>
+              <a:fillRef idx="1">
+                <a:schemeClr val="accent1"/>
+              </a:fillRef>
+              <a:effectRef idx="0">
+                <a:schemeClr val="accent1"/>
+              </a:effectRef>
+              <a:fontRef idx="minor">
+                <a:schemeClr val="lt1"/>
+              </a:fontRef>
+            </p:style>
+            <p:txBody>
+              <a:bodyPr rtlCol="0" anchor="ctr"/>
+              <a:lstStyle/>
+              <a:p>
+                <a:pPr algn="ctr"/>
+                <a:r>
+                  <a:rPr lang="en-GB" sz="1200" b="1" dirty="0">
+                    <a:solidFill>
+                      <a:schemeClr val="bg1"/>
+                    </a:solidFill>
+                    <a:latin typeface="Courier New" panose="02070309020205020404" pitchFamily="49" charset="0"/>
+                    <a:cs typeface="Courier New" panose="02070309020205020404" pitchFamily="49" charset="0"/>
+                  </a:rPr>
+                  <a:t>2</a:t>
+                </a:r>
+              </a:p>
+            </p:txBody>
+          </p:sp>
+          <p:sp>
+            <p:nvSpPr>
+              <p:cNvPr id="23" name="Rectangle 22">
+                <a:extLst>
+                  <a:ext uri="{FF2B5EF4-FFF2-40B4-BE49-F238E27FC236}">
+                    <a16:creationId xmlns:a16="http://schemas.microsoft.com/office/drawing/2014/main" id="{56F028CD-AF66-44CD-A3C5-8BEAF42B7A3E}"/>
+                  </a:ext>
+                </a:extLst>
+              </p:cNvPr>
+              <p:cNvSpPr/>
+              <p:nvPr/>
+            </p:nvSpPr>
+            <p:spPr>
+              <a:xfrm>
+                <a:off x="5084858" y="2024266"/>
+                <a:ext cx="360298" cy="330594"/>
+              </a:xfrm>
+              <a:prstGeom prst="rect">
+                <a:avLst/>
+              </a:prstGeom>
+              <a:solidFill>
+                <a:schemeClr val="tx1">
+                  <a:lumMod val="65000"/>
+                  <a:lumOff val="35000"/>
+                </a:schemeClr>
+              </a:solidFill>
+              <a:ln w="6350"/>
+            </p:spPr>
+            <p:style>
+              <a:lnRef idx="2">
+                <a:schemeClr val="accent1">
+                  <a:shade val="50000"/>
+                </a:schemeClr>
+              </a:lnRef>
+              <a:fillRef idx="1">
+                <a:schemeClr val="accent1"/>
+              </a:fillRef>
+              <a:effectRef idx="0">
+                <a:schemeClr val="accent1"/>
+              </a:effectRef>
+              <a:fontRef idx="minor">
+                <a:schemeClr val="lt1"/>
+              </a:fontRef>
+            </p:style>
+            <p:txBody>
+              <a:bodyPr rtlCol="0" anchor="ctr"/>
+              <a:lstStyle/>
+              <a:p>
+                <a:pPr algn="ctr"/>
+                <a:r>
+                  <a:rPr lang="en-GB" sz="1200" b="1" dirty="0">
+                    <a:solidFill>
+                      <a:schemeClr val="bg1"/>
+                    </a:solidFill>
+                    <a:latin typeface="Courier New" panose="02070309020205020404" pitchFamily="49" charset="0"/>
+                    <a:cs typeface="Courier New" panose="02070309020205020404" pitchFamily="49" charset="0"/>
+                  </a:rPr>
+                  <a:t>1</a:t>
+                </a:r>
+              </a:p>
+            </p:txBody>
+          </p:sp>
+          <p:sp>
+            <p:nvSpPr>
+              <p:cNvPr id="24" name="Rectangle 23">
+                <a:extLst>
+                  <a:ext uri="{FF2B5EF4-FFF2-40B4-BE49-F238E27FC236}">
+                    <a16:creationId xmlns:a16="http://schemas.microsoft.com/office/drawing/2014/main" id="{30161A0D-60AA-4F09-9332-7E38D1F89F40}"/>
+                  </a:ext>
+                </a:extLst>
+              </p:cNvPr>
+              <p:cNvSpPr/>
+              <p:nvPr/>
+            </p:nvSpPr>
+            <p:spPr>
+              <a:xfrm>
+                <a:off x="5444393" y="2024266"/>
+                <a:ext cx="360298" cy="330594"/>
+              </a:xfrm>
+              <a:prstGeom prst="rect">
+                <a:avLst/>
+              </a:prstGeom>
+              <a:solidFill>
+                <a:schemeClr val="tx1">
+                  <a:lumMod val="65000"/>
+                  <a:lumOff val="35000"/>
+                </a:schemeClr>
+              </a:solidFill>
+              <a:ln w="6350"/>
+            </p:spPr>
+            <p:style>
+              <a:lnRef idx="2">
+                <a:schemeClr val="accent1">
+                  <a:shade val="50000"/>
+                </a:schemeClr>
+              </a:lnRef>
+              <a:fillRef idx="1">
+                <a:schemeClr val="accent1"/>
+              </a:fillRef>
+              <a:effectRef idx="0">
+                <a:schemeClr val="accent1"/>
+              </a:effectRef>
+              <a:fontRef idx="minor">
+                <a:schemeClr val="lt1"/>
+              </a:fontRef>
+            </p:style>
+            <p:txBody>
+              <a:bodyPr rtlCol="0" anchor="ctr"/>
+              <a:lstStyle/>
+              <a:p>
+                <a:pPr algn="ctr"/>
+                <a:r>
+                  <a:rPr lang="en-GB" sz="1200" b="1" dirty="0">
+                    <a:solidFill>
+                      <a:schemeClr val="bg1"/>
+                    </a:solidFill>
+                    <a:latin typeface="Courier New" panose="02070309020205020404" pitchFamily="49" charset="0"/>
+                    <a:cs typeface="Courier New" panose="02070309020205020404" pitchFamily="49" charset="0"/>
+                  </a:rPr>
+                  <a:t>0</a:t>
+                </a:r>
+              </a:p>
+            </p:txBody>
+          </p:sp>
+        </p:grpSp>
+        <p:grpSp>
+          <p:nvGrpSpPr>
+            <p:cNvPr id="35" name="Group 34">
+              <a:extLst>
+                <a:ext uri="{FF2B5EF4-FFF2-40B4-BE49-F238E27FC236}">
+                  <a16:creationId xmlns:a16="http://schemas.microsoft.com/office/drawing/2014/main" id="{B460C4D4-C566-4110-BE02-63CF995C9E52}"/>
+                </a:ext>
+              </a:extLst>
+            </p:cNvPr>
+            <p:cNvGrpSpPr/>
+            <p:nvPr/>
+          </p:nvGrpSpPr>
+          <p:grpSpPr>
+            <a:xfrm>
+              <a:off x="4657478" y="4094085"/>
+              <a:ext cx="2877043" cy="330594"/>
+              <a:chOff x="2905256" y="3597656"/>
+              <a:chExt cx="2877043" cy="330594"/>
+            </a:xfrm>
+          </p:grpSpPr>
+          <p:sp>
+            <p:nvSpPr>
+              <p:cNvPr id="25" name="Rectangle 24">
+                <a:extLst>
+                  <a:ext uri="{FF2B5EF4-FFF2-40B4-BE49-F238E27FC236}">
+                    <a16:creationId xmlns:a16="http://schemas.microsoft.com/office/drawing/2014/main" id="{76CF2858-975B-44B4-88C6-6D67C556B6D4}"/>
+                  </a:ext>
+                </a:extLst>
+              </p:cNvPr>
+              <p:cNvSpPr/>
+              <p:nvPr/>
+            </p:nvSpPr>
+            <p:spPr>
+              <a:xfrm>
+                <a:off x="2905256" y="3597656"/>
+                <a:ext cx="360298" cy="330594"/>
+              </a:xfrm>
+              <a:prstGeom prst="rect">
+                <a:avLst/>
+              </a:prstGeom>
+              <a:solidFill>
+                <a:schemeClr val="tx1">
+                  <a:lumMod val="65000"/>
+                  <a:lumOff val="35000"/>
+                </a:schemeClr>
+              </a:solidFill>
+              <a:ln w="6350"/>
+            </p:spPr>
+            <p:style>
+              <a:lnRef idx="2">
+                <a:schemeClr val="accent1">
+                  <a:shade val="50000"/>
+                </a:schemeClr>
+              </a:lnRef>
+              <a:fillRef idx="1">
+                <a:schemeClr val="accent1"/>
+              </a:fillRef>
+              <a:effectRef idx="0">
+                <a:schemeClr val="accent1"/>
+              </a:effectRef>
+              <a:fontRef idx="minor">
+                <a:schemeClr val="lt1"/>
+              </a:fontRef>
+            </p:style>
+            <p:txBody>
+              <a:bodyPr rtlCol="0" anchor="ctr"/>
+              <a:lstStyle/>
+              <a:p>
+                <a:pPr algn="ctr"/>
+                <a:r>
+                  <a:rPr lang="en-GB" sz="1200" b="1" dirty="0">
+                    <a:solidFill>
+                      <a:schemeClr val="bg1"/>
+                    </a:solidFill>
+                    <a:latin typeface="Courier New" panose="02070309020205020404" pitchFamily="49" charset="0"/>
+                    <a:cs typeface="Courier New" panose="02070309020205020404" pitchFamily="49" charset="0"/>
+                  </a:rPr>
+                  <a:t>7</a:t>
+                </a:r>
+              </a:p>
+            </p:txBody>
+          </p:sp>
+          <p:sp>
+            <p:nvSpPr>
+              <p:cNvPr id="26" name="Rectangle 25">
+                <a:extLst>
+                  <a:ext uri="{FF2B5EF4-FFF2-40B4-BE49-F238E27FC236}">
+                    <a16:creationId xmlns:a16="http://schemas.microsoft.com/office/drawing/2014/main" id="{32A12C0B-9BF3-4700-A4FE-75D85C912BC7}"/>
+                  </a:ext>
+                </a:extLst>
+              </p:cNvPr>
+              <p:cNvSpPr/>
+              <p:nvPr/>
+            </p:nvSpPr>
+            <p:spPr>
+              <a:xfrm>
+                <a:off x="3264791" y="3597656"/>
+                <a:ext cx="360298" cy="330594"/>
+              </a:xfrm>
+              <a:prstGeom prst="rect">
+                <a:avLst/>
+              </a:prstGeom>
+              <a:solidFill>
+                <a:srgbClr val="FF0000"/>
+              </a:solidFill>
+              <a:ln w="6350"/>
+            </p:spPr>
+            <p:style>
+              <a:lnRef idx="2">
+                <a:schemeClr val="accent1">
+                  <a:shade val="50000"/>
+                </a:schemeClr>
+              </a:lnRef>
+              <a:fillRef idx="1">
+                <a:schemeClr val="accent1"/>
+              </a:fillRef>
+              <a:effectRef idx="0">
+                <a:schemeClr val="accent1"/>
+              </a:effectRef>
+              <a:fontRef idx="minor">
+                <a:schemeClr val="lt1"/>
+              </a:fontRef>
+            </p:style>
+            <p:txBody>
+              <a:bodyPr rtlCol="0" anchor="ctr"/>
+              <a:lstStyle/>
+              <a:p>
+                <a:pPr algn="ctr"/>
+                <a:r>
+                  <a:rPr lang="en-GB" sz="1200" b="1" dirty="0">
+                    <a:solidFill>
+                      <a:schemeClr val="bg1"/>
+                    </a:solidFill>
+                    <a:latin typeface="Courier New" panose="02070309020205020404" pitchFamily="49" charset="0"/>
+                    <a:cs typeface="Courier New" panose="02070309020205020404" pitchFamily="49" charset="0"/>
+                  </a:rPr>
+                  <a:t>6</a:t>
+                </a:r>
+              </a:p>
+            </p:txBody>
+          </p:sp>
+          <p:sp>
+            <p:nvSpPr>
+              <p:cNvPr id="27" name="Rectangle 26">
+                <a:extLst>
+                  <a:ext uri="{FF2B5EF4-FFF2-40B4-BE49-F238E27FC236}">
+                    <a16:creationId xmlns:a16="http://schemas.microsoft.com/office/drawing/2014/main" id="{75351B4F-4302-48FA-8AF3-A60B397CF696}"/>
+                  </a:ext>
+                </a:extLst>
+              </p:cNvPr>
+              <p:cNvSpPr/>
+              <p:nvPr/>
+            </p:nvSpPr>
+            <p:spPr>
+              <a:xfrm>
+                <a:off x="3624326" y="3597656"/>
+                <a:ext cx="360298" cy="330594"/>
+              </a:xfrm>
+              <a:prstGeom prst="rect">
+                <a:avLst/>
+              </a:prstGeom>
+              <a:solidFill>
+                <a:schemeClr val="tx1">
+                  <a:lumMod val="65000"/>
+                  <a:lumOff val="35000"/>
+                </a:schemeClr>
+              </a:solidFill>
+              <a:ln w="6350"/>
+            </p:spPr>
+            <p:style>
+              <a:lnRef idx="2">
+                <a:schemeClr val="accent1">
+                  <a:shade val="50000"/>
+                </a:schemeClr>
+              </a:lnRef>
+              <a:fillRef idx="1">
+                <a:schemeClr val="accent1"/>
+              </a:fillRef>
+              <a:effectRef idx="0">
+                <a:schemeClr val="accent1"/>
+              </a:effectRef>
+              <a:fontRef idx="minor">
+                <a:schemeClr val="lt1"/>
+              </a:fontRef>
+            </p:style>
+            <p:txBody>
+              <a:bodyPr rtlCol="0" anchor="ctr"/>
+              <a:lstStyle/>
+              <a:p>
+                <a:pPr algn="ctr"/>
+                <a:r>
+                  <a:rPr lang="en-GB" sz="1200" b="1" dirty="0">
+                    <a:solidFill>
+                      <a:schemeClr val="bg1"/>
+                    </a:solidFill>
+                    <a:latin typeface="Courier New" panose="02070309020205020404" pitchFamily="49" charset="0"/>
+                    <a:cs typeface="Courier New" panose="02070309020205020404" pitchFamily="49" charset="0"/>
+                  </a:rPr>
+                  <a:t>5</a:t>
+                </a:r>
+              </a:p>
+            </p:txBody>
+          </p:sp>
+          <p:sp>
+            <p:nvSpPr>
+              <p:cNvPr id="28" name="Rectangle 27">
+                <a:extLst>
+                  <a:ext uri="{FF2B5EF4-FFF2-40B4-BE49-F238E27FC236}">
+                    <a16:creationId xmlns:a16="http://schemas.microsoft.com/office/drawing/2014/main" id="{A4761B4D-E78E-429D-8740-668BA7DB3E95}"/>
+                  </a:ext>
+                </a:extLst>
+              </p:cNvPr>
+              <p:cNvSpPr/>
+              <p:nvPr/>
+            </p:nvSpPr>
+            <p:spPr>
+              <a:xfrm>
+                <a:off x="3983861" y="3597656"/>
+                <a:ext cx="360298" cy="330594"/>
+              </a:xfrm>
+              <a:prstGeom prst="rect">
+                <a:avLst/>
+              </a:prstGeom>
+              <a:solidFill>
+                <a:srgbClr val="FF0000"/>
+              </a:solidFill>
+              <a:ln w="6350"/>
+            </p:spPr>
+            <p:style>
+              <a:lnRef idx="2">
+                <a:schemeClr val="accent1">
+                  <a:shade val="50000"/>
+                </a:schemeClr>
+              </a:lnRef>
+              <a:fillRef idx="1">
+                <a:schemeClr val="accent1"/>
+              </a:fillRef>
+              <a:effectRef idx="0">
+                <a:schemeClr val="accent1"/>
+              </a:effectRef>
+              <a:fontRef idx="minor">
+                <a:schemeClr val="lt1"/>
+              </a:fontRef>
+            </p:style>
+            <p:txBody>
+              <a:bodyPr rtlCol="0" anchor="ctr"/>
+              <a:lstStyle/>
+              <a:p>
+                <a:pPr algn="ctr"/>
+                <a:r>
+                  <a:rPr lang="en-GB" sz="1200" b="1" dirty="0">
+                    <a:solidFill>
+                      <a:schemeClr val="bg1"/>
+                    </a:solidFill>
+                    <a:latin typeface="Courier New" panose="02070309020205020404" pitchFamily="49" charset="0"/>
+                    <a:cs typeface="Courier New" panose="02070309020205020404" pitchFamily="49" charset="0"/>
+                  </a:rPr>
+                  <a:t>4</a:t>
+                </a:r>
+              </a:p>
+            </p:txBody>
+          </p:sp>
+          <p:sp>
+            <p:nvSpPr>
+              <p:cNvPr id="29" name="Rectangle 28">
+                <a:extLst>
+                  <a:ext uri="{FF2B5EF4-FFF2-40B4-BE49-F238E27FC236}">
+                    <a16:creationId xmlns:a16="http://schemas.microsoft.com/office/drawing/2014/main" id="{3CE6368B-F209-4EDE-BE28-A58939A33D17}"/>
+                  </a:ext>
+                </a:extLst>
+              </p:cNvPr>
+              <p:cNvSpPr/>
+              <p:nvPr/>
+            </p:nvSpPr>
+            <p:spPr>
+              <a:xfrm>
+                <a:off x="4343396" y="3597656"/>
+                <a:ext cx="360298" cy="330594"/>
+              </a:xfrm>
+              <a:prstGeom prst="rect">
+                <a:avLst/>
+              </a:prstGeom>
+              <a:solidFill>
+                <a:schemeClr val="tx1">
+                  <a:lumMod val="65000"/>
+                  <a:lumOff val="35000"/>
+                </a:schemeClr>
+              </a:solidFill>
+              <a:ln w="6350"/>
+            </p:spPr>
+            <p:style>
+              <a:lnRef idx="2">
+                <a:schemeClr val="accent1">
+                  <a:shade val="50000"/>
+                </a:schemeClr>
+              </a:lnRef>
+              <a:fillRef idx="1">
+                <a:schemeClr val="accent1"/>
+              </a:fillRef>
+              <a:effectRef idx="0">
+                <a:schemeClr val="accent1"/>
+              </a:effectRef>
+              <a:fontRef idx="minor">
+                <a:schemeClr val="lt1"/>
+              </a:fontRef>
+            </p:style>
+            <p:txBody>
+              <a:bodyPr rtlCol="0" anchor="ctr"/>
+              <a:lstStyle/>
+              <a:p>
+                <a:pPr algn="ctr"/>
+                <a:r>
+                  <a:rPr lang="en-GB" sz="1200" b="1" dirty="0">
+                    <a:solidFill>
+                      <a:schemeClr val="bg1"/>
+                    </a:solidFill>
+                    <a:latin typeface="Courier New" panose="02070309020205020404" pitchFamily="49" charset="0"/>
+                    <a:cs typeface="Courier New" panose="02070309020205020404" pitchFamily="49" charset="0"/>
+                  </a:rPr>
+                  <a:t>3</a:t>
+                </a:r>
+              </a:p>
+            </p:txBody>
+          </p:sp>
+          <p:sp>
+            <p:nvSpPr>
+              <p:cNvPr id="30" name="Rectangle 29">
+                <a:extLst>
+                  <a:ext uri="{FF2B5EF4-FFF2-40B4-BE49-F238E27FC236}">
+                    <a16:creationId xmlns:a16="http://schemas.microsoft.com/office/drawing/2014/main" id="{08231C4B-DD79-4A39-82A1-B83C16A4F6D9}"/>
+                  </a:ext>
+                </a:extLst>
+              </p:cNvPr>
+              <p:cNvSpPr/>
+              <p:nvPr/>
+            </p:nvSpPr>
+            <p:spPr>
+              <a:xfrm>
+                <a:off x="4702931" y="3597656"/>
+                <a:ext cx="360298" cy="330594"/>
+              </a:xfrm>
+              <a:prstGeom prst="rect">
+                <a:avLst/>
+              </a:prstGeom>
+              <a:solidFill>
+                <a:srgbClr val="FF0000"/>
+              </a:solidFill>
+              <a:ln w="6350"/>
+            </p:spPr>
+            <p:style>
+              <a:lnRef idx="2">
+                <a:schemeClr val="accent1">
+                  <a:shade val="50000"/>
+                </a:schemeClr>
+              </a:lnRef>
+              <a:fillRef idx="1">
+                <a:schemeClr val="accent1"/>
+              </a:fillRef>
+              <a:effectRef idx="0">
+                <a:schemeClr val="accent1"/>
+              </a:effectRef>
+              <a:fontRef idx="minor">
+                <a:schemeClr val="lt1"/>
+              </a:fontRef>
+            </p:style>
+            <p:txBody>
+              <a:bodyPr rtlCol="0" anchor="ctr"/>
+              <a:lstStyle/>
+              <a:p>
+                <a:pPr algn="ctr"/>
+                <a:r>
+                  <a:rPr lang="en-GB" sz="1200" b="1" dirty="0">
+                    <a:solidFill>
+                      <a:schemeClr val="bg1"/>
+                    </a:solidFill>
+                    <a:latin typeface="Courier New" panose="02070309020205020404" pitchFamily="49" charset="0"/>
+                    <a:cs typeface="Courier New" panose="02070309020205020404" pitchFamily="49" charset="0"/>
+                  </a:rPr>
+                  <a:t>2</a:t>
+                </a:r>
+              </a:p>
+            </p:txBody>
+          </p:sp>
+          <p:sp>
+            <p:nvSpPr>
+              <p:cNvPr id="31" name="Rectangle 30">
+                <a:extLst>
+                  <a:ext uri="{FF2B5EF4-FFF2-40B4-BE49-F238E27FC236}">
+                    <a16:creationId xmlns:a16="http://schemas.microsoft.com/office/drawing/2014/main" id="{03AE26EB-D85E-4F90-A9E2-3C2886632C78}"/>
+                  </a:ext>
+                </a:extLst>
+              </p:cNvPr>
+              <p:cNvSpPr/>
+              <p:nvPr/>
+            </p:nvSpPr>
+            <p:spPr>
+              <a:xfrm>
+                <a:off x="5062466" y="3597656"/>
+                <a:ext cx="360298" cy="330594"/>
+              </a:xfrm>
+              <a:prstGeom prst="rect">
+                <a:avLst/>
+              </a:prstGeom>
+              <a:solidFill>
+                <a:schemeClr val="tx1">
+                  <a:lumMod val="65000"/>
+                  <a:lumOff val="35000"/>
+                </a:schemeClr>
+              </a:solidFill>
+              <a:ln w="6350"/>
+            </p:spPr>
+            <p:style>
+              <a:lnRef idx="2">
+                <a:schemeClr val="accent1">
+                  <a:shade val="50000"/>
+                </a:schemeClr>
+              </a:lnRef>
+              <a:fillRef idx="1">
+                <a:schemeClr val="accent1"/>
+              </a:fillRef>
+              <a:effectRef idx="0">
+                <a:schemeClr val="accent1"/>
+              </a:effectRef>
+              <a:fontRef idx="minor">
+                <a:schemeClr val="lt1"/>
+              </a:fontRef>
+            </p:style>
+            <p:txBody>
+              <a:bodyPr rtlCol="0" anchor="ctr"/>
+              <a:lstStyle/>
+              <a:p>
+                <a:pPr algn="ctr"/>
+                <a:r>
+                  <a:rPr lang="en-GB" sz="1200" b="1" dirty="0">
+                    <a:solidFill>
+                      <a:schemeClr val="bg1"/>
+                    </a:solidFill>
+                    <a:latin typeface="Courier New" panose="02070309020205020404" pitchFamily="49" charset="0"/>
+                    <a:cs typeface="Courier New" panose="02070309020205020404" pitchFamily="49" charset="0"/>
+                  </a:rPr>
+                  <a:t>1</a:t>
+                </a:r>
+              </a:p>
+            </p:txBody>
+          </p:sp>
+          <p:sp>
+            <p:nvSpPr>
+              <p:cNvPr id="32" name="Rectangle 31">
+                <a:extLst>
+                  <a:ext uri="{FF2B5EF4-FFF2-40B4-BE49-F238E27FC236}">
+                    <a16:creationId xmlns:a16="http://schemas.microsoft.com/office/drawing/2014/main" id="{8BDDA879-1727-4F9D-A220-5C34C0EBF9F4}"/>
+                  </a:ext>
+                </a:extLst>
+              </p:cNvPr>
+              <p:cNvSpPr/>
+              <p:nvPr/>
+            </p:nvSpPr>
+            <p:spPr>
+              <a:xfrm>
+                <a:off x="5422001" y="3597656"/>
+                <a:ext cx="360298" cy="330594"/>
+              </a:xfrm>
+              <a:prstGeom prst="rect">
+                <a:avLst/>
+              </a:prstGeom>
+              <a:solidFill>
+                <a:srgbClr val="FF0000"/>
+              </a:solidFill>
+              <a:ln w="6350"/>
+            </p:spPr>
+            <p:style>
+              <a:lnRef idx="2">
+                <a:schemeClr val="accent1">
+                  <a:shade val="50000"/>
+                </a:schemeClr>
+              </a:lnRef>
+              <a:fillRef idx="1">
+                <a:schemeClr val="accent1"/>
+              </a:fillRef>
+              <a:effectRef idx="0">
+                <a:schemeClr val="accent1"/>
+              </a:effectRef>
+              <a:fontRef idx="minor">
+                <a:schemeClr val="lt1"/>
+              </a:fontRef>
+            </p:style>
+            <p:txBody>
+              <a:bodyPr rtlCol="0" anchor="ctr"/>
+              <a:lstStyle/>
+              <a:p>
+                <a:pPr algn="ctr"/>
+                <a:r>
+                  <a:rPr lang="en-GB" sz="1200" b="1" dirty="0">
+                    <a:solidFill>
+                      <a:schemeClr val="bg1"/>
+                    </a:solidFill>
+                    <a:latin typeface="Courier New" panose="02070309020205020404" pitchFamily="49" charset="0"/>
+                    <a:cs typeface="Courier New" panose="02070309020205020404" pitchFamily="49" charset="0"/>
+                  </a:rPr>
+                  <a:t>0</a:t>
+                </a:r>
+              </a:p>
+            </p:txBody>
+          </p:sp>
+        </p:grpSp>
+        <p:sp>
+          <p:nvSpPr>
+            <p:cNvPr id="44" name="TextBox 43">
+              <a:extLst>
+                <a:ext uri="{FF2B5EF4-FFF2-40B4-BE49-F238E27FC236}">
+                  <a16:creationId xmlns:a16="http://schemas.microsoft.com/office/drawing/2014/main" id="{6D354609-47EC-4494-B189-C3681E0C6DD6}"/>
+                </a:ext>
+              </a:extLst>
+            </p:cNvPr>
+            <p:cNvSpPr txBox="1"/>
+            <p:nvPr/>
+          </p:nvSpPr>
+          <p:spPr>
+            <a:xfrm>
+              <a:off x="7754204" y="2266331"/>
+              <a:ext cx="1296144" cy="461665"/>
+            </a:xfrm>
+            <a:prstGeom prst="rect">
+              <a:avLst/>
+            </a:prstGeom>
+            <a:noFill/>
+          </p:spPr>
+          <p:txBody>
+            <a:bodyPr wrap="square" rtlCol="0">
+              <a:spAutoFit/>
+            </a:bodyPr>
+            <a:lstStyle/>
+            <a:p>
+              <a:r>
+                <a:rPr lang="en-GB" sz="1200" b="1" dirty="0"/>
+                <a:t>1 bit per pixel/2 colours</a:t>
+              </a:r>
+            </a:p>
+          </p:txBody>
+        </p:sp>
+        <p:sp>
+          <p:nvSpPr>
+            <p:cNvPr id="45" name="TextBox 44">
+              <a:extLst>
+                <a:ext uri="{FF2B5EF4-FFF2-40B4-BE49-F238E27FC236}">
+                  <a16:creationId xmlns:a16="http://schemas.microsoft.com/office/drawing/2014/main" id="{E74EE594-4C9E-4D42-991C-726760CA7D10}"/>
+                </a:ext>
+              </a:extLst>
+            </p:cNvPr>
+            <p:cNvSpPr txBox="1"/>
+            <p:nvPr/>
+          </p:nvSpPr>
+          <p:spPr>
+            <a:xfrm>
+              <a:off x="7754204" y="3147440"/>
+              <a:ext cx="1296144" cy="461665"/>
+            </a:xfrm>
+            <a:prstGeom prst="rect">
+              <a:avLst/>
+            </a:prstGeom>
+            <a:noFill/>
+          </p:spPr>
+          <p:txBody>
+            <a:bodyPr wrap="square" rtlCol="0">
+              <a:spAutoFit/>
+            </a:bodyPr>
+            <a:lstStyle/>
+            <a:p>
+              <a:r>
+                <a:rPr lang="en-GB" sz="1200" b="1" dirty="0"/>
+                <a:t>2 bit per pixel/4 colours</a:t>
+              </a:r>
+            </a:p>
+          </p:txBody>
+        </p:sp>
+        <p:sp>
+          <p:nvSpPr>
+            <p:cNvPr id="46" name="TextBox 45">
+              <a:extLst>
+                <a:ext uri="{FF2B5EF4-FFF2-40B4-BE49-F238E27FC236}">
+                  <a16:creationId xmlns:a16="http://schemas.microsoft.com/office/drawing/2014/main" id="{64389F34-120D-4F10-9EC7-CE18E0657DD0}"/>
+                </a:ext>
+              </a:extLst>
+            </p:cNvPr>
+            <p:cNvSpPr txBox="1"/>
+            <p:nvPr/>
+          </p:nvSpPr>
+          <p:spPr>
+            <a:xfrm>
+              <a:off x="7725298" y="4077470"/>
+              <a:ext cx="1296144" cy="461665"/>
+            </a:xfrm>
+            <a:prstGeom prst="rect">
+              <a:avLst/>
+            </a:prstGeom>
+            <a:noFill/>
+          </p:spPr>
+          <p:txBody>
+            <a:bodyPr wrap="square" rtlCol="0">
+              <a:spAutoFit/>
+            </a:bodyPr>
+            <a:lstStyle/>
+            <a:p>
+              <a:r>
+                <a:rPr lang="en-GB" sz="1200" b="1" dirty="0"/>
+                <a:t>4 bit per pixel/16 colours</a:t>
+              </a:r>
+            </a:p>
+          </p:txBody>
+        </p:sp>
+      </p:grpSp>
       <p:sp>
         <p:nvSpPr>
-          <p:cNvPr id="6" name="TextBox 5">
-            <a:extLst>
-              <a:ext uri="{FF2B5EF4-FFF2-40B4-BE49-F238E27FC236}">
-                <a16:creationId xmlns:a16="http://schemas.microsoft.com/office/drawing/2014/main" id="{892B8FD2-1AA1-4084-A4AB-09ECA2A505F2}"/>
+          <p:cNvPr id="47" name="TextBox 46">
+            <a:extLst>
+              <a:ext uri="{FF2B5EF4-FFF2-40B4-BE49-F238E27FC236}">
+                <a16:creationId xmlns:a16="http://schemas.microsoft.com/office/drawing/2014/main" id="{7D0960F1-0560-4AA8-BFFA-9A314D0FFE11}"/>
               </a:ext>
             </a:extLst>
           </p:cNvPr>
@@ -10510,8 +11962,8 @@
         </p:nvSpPr>
         <p:spPr>
           <a:xfrm>
-            <a:off x="3048000" y="3244334"/>
-            <a:ext cx="6096000" cy="2308324"/>
+            <a:off x="4848389" y="372102"/>
+            <a:ext cx="2549840" cy="338554"/>
           </a:xfrm>
           <a:prstGeom prst="rect">
             <a:avLst/>
@@ -10519,68 +11971,23 @@
           <a:noFill/>
         </p:spPr>
         <p:txBody>
-          <a:bodyPr wrap="square">
+          <a:bodyPr wrap="square" rtlCol="0">
             <a:spAutoFit/>
           </a:bodyPr>
           <a:lstStyle/>
           <a:p>
+            <a:pPr algn="ctr"/>
             <a:r>
-              <a:rPr lang="en-GB" dirty="0"/>
-              <a:t>Each “ROW” has only 4 pixels</a:t>
+              <a:rPr lang="en-GB" sz="1600" b="1" dirty="0"/>
+              <a:t>Bits to Pixel Mapping</a:t>
             </a:r>
-          </a:p>
-          <a:p>
-            <a:endParaRPr lang="en-GB" dirty="0"/>
-          </a:p>
-          <a:p>
-            <a:pPr marL="285750" indent="-285750">
-              <a:buFont typeface="Symbol" panose="05050102010706020507" pitchFamily="18" charset="2"/>
-              <a:buChar char="Þ"/>
-            </a:pPr>
-            <a:r>
-              <a:rPr lang="en-GB" dirty="0"/>
-              <a:t>256 / 4 = 64 rows to give 256 pixels</a:t>
-            </a:r>
-          </a:p>
-          <a:p>
-            <a:pPr marL="285750" indent="-285750">
-              <a:buFont typeface="Symbol" panose="05050102010706020507" pitchFamily="18" charset="2"/>
-              <a:buChar char="Þ"/>
-            </a:pPr>
-            <a:r>
-              <a:rPr lang="en-GB" dirty="0"/>
-              <a:t>40 columns</a:t>
-            </a:r>
-          </a:p>
-          <a:p>
-            <a:pPr marL="285750" indent="-285750">
-              <a:buFont typeface="Symbol" panose="05050102010706020507" pitchFamily="18" charset="2"/>
-              <a:buChar char="Þ"/>
-            </a:pPr>
-            <a:r>
-              <a:rPr lang="en-GB" dirty="0"/>
-              <a:t>4 pixels for each column then next column – 40 columns</a:t>
-            </a:r>
-          </a:p>
-          <a:p>
-            <a:pPr marL="285750" indent="-285750">
-              <a:buFont typeface="Symbol" panose="05050102010706020507" pitchFamily="18" charset="2"/>
-              <a:buChar char="Þ"/>
-            </a:pPr>
-            <a:endParaRPr lang="en-GB" dirty="0"/>
-          </a:p>
-          <a:p>
-            <a:endParaRPr lang="en-GB" dirty="0"/>
-          </a:p>
-          <a:p>
-            <a:endParaRPr lang="en-GB" dirty="0"/>
           </a:p>
         </p:txBody>
       </p:sp>
     </p:spTree>
     <p:extLst>
       <p:ext uri="{BB962C8B-B14F-4D97-AF65-F5344CB8AC3E}">
-        <p14:creationId xmlns:p14="http://schemas.microsoft.com/office/powerpoint/2010/main" val="2734177366"/>
+        <p14:creationId xmlns:p14="http://schemas.microsoft.com/office/powerpoint/2010/main" val="1086289897"/>
       </p:ext>
     </p:extLst>
   </p:cSld>

</xml_diff>